<commit_message>
More report refinements and presentation nonsense
</commit_message>
<xml_diff>
--- a/docs/presentation/Defense.pptx
+++ b/docs/presentation/Defense.pptx
@@ -12,6 +12,21 @@
     <p:sldId id="260" r:id="rId6"/>
     <p:sldId id="261" r:id="rId7"/>
     <p:sldId id="262" r:id="rId8"/>
+    <p:sldId id="263" r:id="rId9"/>
+    <p:sldId id="264" r:id="rId10"/>
+    <p:sldId id="265" r:id="rId11"/>
+    <p:sldId id="266" r:id="rId12"/>
+    <p:sldId id="267" r:id="rId13"/>
+    <p:sldId id="268" r:id="rId14"/>
+    <p:sldId id="269" r:id="rId15"/>
+    <p:sldId id="270" r:id="rId16"/>
+    <p:sldId id="271" r:id="rId17"/>
+    <p:sldId id="272" r:id="rId18"/>
+    <p:sldId id="273" r:id="rId19"/>
+    <p:sldId id="274" r:id="rId20"/>
+    <p:sldId id="275" r:id="rId21"/>
+    <p:sldId id="277" r:id="rId22"/>
+    <p:sldId id="276" r:id="rId23"/>
   </p:sldIdLst>
   <p:sldSz cx="9144000" cy="6858000" type="screen4x3"/>
   <p:notesSz cx="6858000" cy="9144000"/>
@@ -3164,6 +3179,1784 @@
   <p:clrMapOvr>
     <a:masterClrMapping/>
   </p:clrMapOvr>
+  <p:timing>
+    <p:tnLst>
+      <p:par>
+        <p:cTn id="1" dur="indefinite" restart="never" nodeType="tmRoot"/>
+      </p:par>
+    </p:tnLst>
+  </p:timing>
+</p:sld>
+</file>
+
+<file path=ppt/slides/slide10.xml><?xml version="1.0" encoding="utf-8"?>
+<p:sld xmlns:a="http://schemas.openxmlformats.org/drawingml/2006/main" xmlns:r="http://schemas.openxmlformats.org/officeDocument/2006/relationships" xmlns:p="http://schemas.openxmlformats.org/presentationml/2006/main">
+  <p:cSld>
+    <p:spTree>
+      <p:nvGrpSpPr>
+        <p:cNvPr id="1" name=""/>
+        <p:cNvGrpSpPr/>
+        <p:nvPr/>
+      </p:nvGrpSpPr>
+      <p:grpSpPr>
+        <a:xfrm>
+          <a:off x="0" y="0"/>
+          <a:ext cx="0" cy="0"/>
+          <a:chOff x="0" y="0"/>
+          <a:chExt cx="0" cy="0"/>
+        </a:xfrm>
+      </p:grpSpPr>
+      <p:sp>
+        <p:nvSpPr>
+          <p:cNvPr id="2" name="Title 1"/>
+          <p:cNvSpPr>
+            <a:spLocks noGrp="1"/>
+          </p:cNvSpPr>
+          <p:nvPr>
+            <p:ph type="title"/>
+          </p:nvPr>
+        </p:nvSpPr>
+        <p:spPr/>
+        <p:txBody>
+          <a:bodyPr/>
+          <a:lstStyle/>
+          <a:p>
+            <a:r>
+              <a:rPr lang="en-US" dirty="0" smtClean="0"/>
+              <a:t>EasyPort Protocol (2)</a:t>
+            </a:r>
+            <a:endParaRPr lang="en-US" dirty="0"/>
+          </a:p>
+        </p:txBody>
+      </p:sp>
+      <p:pic>
+        <p:nvPicPr>
+          <p:cNvPr id="3074" name="Picture 2"/>
+          <p:cNvPicPr>
+            <a:picLocks noGrp="1" noChangeAspect="1" noChangeArrowheads="1"/>
+          </p:cNvPicPr>
+          <p:nvPr>
+            <p:ph idx="1"/>
+          </p:nvPr>
+        </p:nvPicPr>
+        <p:blipFill>
+          <a:blip r:embed="rId2">
+            <a:extLst>
+              <a:ext uri="{28A0092B-C50C-407E-A947-70E740481C1C}">
+                <a14:useLocalDpi xmlns:a14="http://schemas.microsoft.com/office/drawing/2010/main" val="0"/>
+              </a:ext>
+            </a:extLst>
+          </a:blip>
+          <a:srcRect/>
+          <a:stretch>
+            <a:fillRect/>
+          </a:stretch>
+        </p:blipFill>
+        <p:spPr bwMode="auto">
+          <a:xfrm>
+            <a:off x="1295400" y="914400"/>
+            <a:ext cx="6438928" cy="5542630"/>
+          </a:xfrm>
+          <a:prstGeom prst="rect">
+            <a:avLst/>
+          </a:prstGeom>
+          <a:noFill/>
+          <a:ln>
+            <a:noFill/>
+          </a:ln>
+          <a:effectLst/>
+          <a:extLst>
+            <a:ext uri="{909E8E84-426E-40DD-AFC4-6F175D3DCCD1}">
+              <a14:hiddenFill xmlns:a14="http://schemas.microsoft.com/office/drawing/2010/main">
+                <a:solidFill>
+                  <a:schemeClr val="accent1"/>
+                </a:solidFill>
+              </a14:hiddenFill>
+            </a:ext>
+            <a:ext uri="{91240B29-F687-4F45-9708-019B960494DF}">
+              <a14:hiddenLine xmlns:a14="http://schemas.microsoft.com/office/drawing/2010/main" w="9525">
+                <a:solidFill>
+                  <a:schemeClr val="tx1"/>
+                </a:solidFill>
+                <a:miter lim="800000"/>
+                <a:headEnd/>
+                <a:tailEnd/>
+              </a14:hiddenLine>
+            </a:ext>
+            <a:ext uri="{AF507438-7753-43E0-B8FC-AC1667EBCBE1}">
+              <a14:hiddenEffects xmlns:a14="http://schemas.microsoft.com/office/drawing/2010/main">
+                <a:effectLst>
+                  <a:outerShdw dist="35921" dir="2700000" algn="ctr" rotWithShape="0">
+                    <a:schemeClr val="bg2"/>
+                  </a:outerShdw>
+                </a:effectLst>
+              </a14:hiddenEffects>
+            </a:ext>
+          </a:extLst>
+        </p:spPr>
+      </p:pic>
+    </p:spTree>
+    <p:extLst>
+      <p:ext uri="{BB962C8B-B14F-4D97-AF65-F5344CB8AC3E}">
+        <p14:creationId xmlns:p14="http://schemas.microsoft.com/office/powerpoint/2010/main" val="1853919336"/>
+      </p:ext>
+    </p:extLst>
+  </p:cSld>
+  <p:clrMapOvr>
+    <a:masterClrMapping/>
+  </p:clrMapOvr>
+  <p:timing>
+    <p:tnLst>
+      <p:par>
+        <p:cTn id="1" dur="indefinite" restart="never" nodeType="tmRoot"/>
+      </p:par>
+    </p:tnLst>
+  </p:timing>
+</p:sld>
+</file>
+
+<file path=ppt/slides/slide11.xml><?xml version="1.0" encoding="utf-8"?>
+<p:sld xmlns:a="http://schemas.openxmlformats.org/drawingml/2006/main" xmlns:r="http://schemas.openxmlformats.org/officeDocument/2006/relationships" xmlns:p="http://schemas.openxmlformats.org/presentationml/2006/main">
+  <p:cSld>
+    <p:spTree>
+      <p:nvGrpSpPr>
+        <p:cNvPr id="1" name=""/>
+        <p:cNvGrpSpPr/>
+        <p:nvPr/>
+      </p:nvGrpSpPr>
+      <p:grpSpPr>
+        <a:xfrm>
+          <a:off x="0" y="0"/>
+          <a:ext cx="0" cy="0"/>
+          <a:chOff x="0" y="0"/>
+          <a:chExt cx="0" cy="0"/>
+        </a:xfrm>
+      </p:grpSpPr>
+      <p:sp>
+        <p:nvSpPr>
+          <p:cNvPr id="2" name="Title 1"/>
+          <p:cNvSpPr>
+            <a:spLocks noGrp="1"/>
+          </p:cNvSpPr>
+          <p:nvPr>
+            <p:ph type="title"/>
+          </p:nvPr>
+        </p:nvSpPr>
+        <p:spPr/>
+        <p:txBody>
+          <a:bodyPr/>
+          <a:lstStyle/>
+          <a:p>
+            <a:r>
+              <a:rPr lang="en-US" dirty="0" smtClean="0"/>
+              <a:t>Making an EasyPort Mark I</a:t>
+            </a:r>
+            <a:endParaRPr lang="en-US" dirty="0"/>
+          </a:p>
+        </p:txBody>
+      </p:sp>
+      <p:sp>
+        <p:nvSpPr>
+          <p:cNvPr id="3" name="Content Placeholder 2"/>
+          <p:cNvSpPr>
+            <a:spLocks noGrp="1"/>
+          </p:cNvSpPr>
+          <p:nvPr>
+            <p:ph idx="1"/>
+          </p:nvPr>
+        </p:nvSpPr>
+        <p:spPr/>
+        <p:txBody>
+          <a:bodyPr/>
+          <a:lstStyle/>
+          <a:p>
+            <a:r>
+              <a:rPr lang="en-US" dirty="0" smtClean="0"/>
+              <a:t>Arduino Uno R3</a:t>
+            </a:r>
+          </a:p>
+          <a:p>
+            <a:pPr lvl="1"/>
+            <a:r>
+              <a:rPr lang="en-US" dirty="0" smtClean="0"/>
+              <a:t>Never meant to be final implementation, but useful as a proof of concept prototype</a:t>
+            </a:r>
+          </a:p>
+          <a:p>
+            <a:r>
+              <a:rPr lang="en-US" dirty="0" smtClean="0"/>
+              <a:t>Fail-</a:t>
+            </a:r>
+            <a:r>
+              <a:rPr lang="en-US" dirty="0" err="1" smtClean="0"/>
+              <a:t>duino</a:t>
+            </a:r>
+            <a:endParaRPr lang="en-US" dirty="0" smtClean="0"/>
+          </a:p>
+          <a:p>
+            <a:pPr lvl="1"/>
+            <a:r>
+              <a:rPr lang="en-US" dirty="0" smtClean="0"/>
+              <a:t>Arduino only ever received 0xFF serial characters</a:t>
+            </a:r>
+          </a:p>
+          <a:p>
+            <a:pPr lvl="1"/>
+            <a:r>
+              <a:rPr lang="en-US" dirty="0" smtClean="0"/>
+              <a:t>AGG Software Advanced Serial Port Monitor</a:t>
+            </a:r>
+          </a:p>
+          <a:p>
+            <a:pPr lvl="2"/>
+            <a:r>
+              <a:rPr lang="en-US" dirty="0" smtClean="0"/>
+              <a:t>Arduino can’t do the required flow control without modification!</a:t>
+            </a:r>
+            <a:endParaRPr lang="en-US" dirty="0"/>
+          </a:p>
+        </p:txBody>
+      </p:sp>
+    </p:spTree>
+    <p:extLst>
+      <p:ext uri="{BB962C8B-B14F-4D97-AF65-F5344CB8AC3E}">
+        <p14:creationId xmlns:p14="http://schemas.microsoft.com/office/powerpoint/2010/main" val="4223802089"/>
+      </p:ext>
+    </p:extLst>
+  </p:cSld>
+  <p:clrMapOvr>
+    <a:masterClrMapping/>
+  </p:clrMapOvr>
+  <p:timing>
+    <p:tnLst>
+      <p:par>
+        <p:cTn id="1" dur="indefinite" restart="never" nodeType="tmRoot"/>
+      </p:par>
+    </p:tnLst>
+  </p:timing>
+</p:sld>
+</file>
+
+<file path=ppt/slides/slide12.xml><?xml version="1.0" encoding="utf-8"?>
+<p:sld xmlns:a="http://schemas.openxmlformats.org/drawingml/2006/main" xmlns:r="http://schemas.openxmlformats.org/officeDocument/2006/relationships" xmlns:p="http://schemas.openxmlformats.org/presentationml/2006/main">
+  <p:cSld>
+    <p:spTree>
+      <p:nvGrpSpPr>
+        <p:cNvPr id="1" name=""/>
+        <p:cNvGrpSpPr/>
+        <p:nvPr/>
+      </p:nvGrpSpPr>
+      <p:grpSpPr>
+        <a:xfrm>
+          <a:off x="0" y="0"/>
+          <a:ext cx="0" cy="0"/>
+          <a:chOff x="0" y="0"/>
+          <a:chExt cx="0" cy="0"/>
+        </a:xfrm>
+      </p:grpSpPr>
+      <p:sp>
+        <p:nvSpPr>
+          <p:cNvPr id="2" name="Title 1"/>
+          <p:cNvSpPr>
+            <a:spLocks noGrp="1"/>
+          </p:cNvSpPr>
+          <p:nvPr>
+            <p:ph type="title"/>
+          </p:nvPr>
+        </p:nvSpPr>
+        <p:spPr/>
+        <p:txBody>
+          <a:bodyPr/>
+          <a:lstStyle/>
+          <a:p>
+            <a:r>
+              <a:rPr lang="en-US" dirty="0" smtClean="0"/>
+              <a:t>Making an EasyPort Mark II</a:t>
+            </a:r>
+            <a:endParaRPr lang="en-US" dirty="0"/>
+          </a:p>
+        </p:txBody>
+      </p:sp>
+      <p:sp>
+        <p:nvSpPr>
+          <p:cNvPr id="3" name="Content Placeholder 2"/>
+          <p:cNvSpPr>
+            <a:spLocks noGrp="1"/>
+          </p:cNvSpPr>
+          <p:nvPr>
+            <p:ph idx="1"/>
+          </p:nvPr>
+        </p:nvSpPr>
+        <p:spPr/>
+        <p:txBody>
+          <a:bodyPr/>
+          <a:lstStyle/>
+          <a:p>
+            <a:r>
+              <a:rPr lang="en-US" dirty="0" smtClean="0"/>
+              <a:t>Write a proof on concept emulator</a:t>
+            </a:r>
+          </a:p>
+          <a:p>
+            <a:r>
+              <a:rPr lang="en-US" dirty="0" smtClean="0"/>
+              <a:t>Desktop application using com0com loopback</a:t>
+            </a:r>
+          </a:p>
+          <a:p>
+            <a:pPr lvl="1"/>
+            <a:r>
+              <a:rPr lang="en-US" dirty="0" smtClean="0"/>
+              <a:t>com0com allows serial port emulation</a:t>
+            </a:r>
+          </a:p>
+          <a:p>
+            <a:r>
+              <a:rPr lang="en-US" dirty="0" smtClean="0"/>
+              <a:t>Implemented discovered protocol</a:t>
+            </a:r>
+          </a:p>
+          <a:p>
+            <a:pPr lvl="1"/>
+            <a:r>
+              <a:rPr lang="en-US" dirty="0" smtClean="0"/>
+              <a:t>Able to interact with EasyVeep simulations!</a:t>
+            </a:r>
+            <a:endParaRPr lang="en-US" dirty="0"/>
+          </a:p>
+        </p:txBody>
+      </p:sp>
+    </p:spTree>
+    <p:extLst>
+      <p:ext uri="{BB962C8B-B14F-4D97-AF65-F5344CB8AC3E}">
+        <p14:creationId xmlns:p14="http://schemas.microsoft.com/office/powerpoint/2010/main" val="314732534"/>
+      </p:ext>
+    </p:extLst>
+  </p:cSld>
+  <p:clrMapOvr>
+    <a:masterClrMapping/>
+  </p:clrMapOvr>
+  <p:timing>
+    <p:tnLst>
+      <p:par>
+        <p:cTn id="1" dur="indefinite" restart="never" nodeType="tmRoot"/>
+      </p:par>
+    </p:tnLst>
+  </p:timing>
+</p:sld>
+</file>
+
+<file path=ppt/slides/slide13.xml><?xml version="1.0" encoding="utf-8"?>
+<p:sld xmlns:a="http://schemas.openxmlformats.org/drawingml/2006/main" xmlns:r="http://schemas.openxmlformats.org/officeDocument/2006/relationships" xmlns:p="http://schemas.openxmlformats.org/presentationml/2006/main">
+  <p:cSld>
+    <p:spTree>
+      <p:nvGrpSpPr>
+        <p:cNvPr id="1" name=""/>
+        <p:cNvGrpSpPr/>
+        <p:nvPr/>
+      </p:nvGrpSpPr>
+      <p:grpSpPr>
+        <a:xfrm>
+          <a:off x="0" y="0"/>
+          <a:ext cx="0" cy="0"/>
+          <a:chOff x="0" y="0"/>
+          <a:chExt cx="0" cy="0"/>
+        </a:xfrm>
+      </p:grpSpPr>
+      <p:sp>
+        <p:nvSpPr>
+          <p:cNvPr id="2" name="Title 1"/>
+          <p:cNvSpPr>
+            <a:spLocks noGrp="1"/>
+          </p:cNvSpPr>
+          <p:nvPr>
+            <p:ph type="title"/>
+          </p:nvPr>
+        </p:nvSpPr>
+        <p:spPr/>
+        <p:txBody>
+          <a:bodyPr/>
+          <a:lstStyle/>
+          <a:p>
+            <a:r>
+              <a:rPr lang="en-US" dirty="0" smtClean="0"/>
+              <a:t>Making an EasyPort Mark II (2)</a:t>
+            </a:r>
+            <a:endParaRPr lang="en-US" dirty="0"/>
+          </a:p>
+        </p:txBody>
+      </p:sp>
+      <p:pic>
+        <p:nvPicPr>
+          <p:cNvPr id="4" name="Content Placeholder 3"/>
+          <p:cNvPicPr>
+            <a:picLocks noGrp="1"/>
+          </p:cNvPicPr>
+          <p:nvPr>
+            <p:ph idx="1"/>
+          </p:nvPr>
+        </p:nvPicPr>
+        <p:blipFill>
+          <a:blip r:embed="rId2" cstate="print"/>
+          <a:srcRect/>
+          <a:stretch>
+            <a:fillRect/>
+          </a:stretch>
+        </p:blipFill>
+        <p:spPr bwMode="auto">
+          <a:xfrm>
+            <a:off x="862012" y="1824831"/>
+            <a:ext cx="7419975" cy="4076700"/>
+          </a:xfrm>
+          <a:prstGeom prst="rect">
+            <a:avLst/>
+          </a:prstGeom>
+          <a:noFill/>
+          <a:ln w="9525">
+            <a:noFill/>
+            <a:miter lim="800000"/>
+            <a:headEnd/>
+            <a:tailEnd/>
+          </a:ln>
+        </p:spPr>
+      </p:pic>
+    </p:spTree>
+    <p:extLst>
+      <p:ext uri="{BB962C8B-B14F-4D97-AF65-F5344CB8AC3E}">
+        <p14:creationId xmlns:p14="http://schemas.microsoft.com/office/powerpoint/2010/main" val="1689680106"/>
+      </p:ext>
+    </p:extLst>
+  </p:cSld>
+  <p:clrMapOvr>
+    <a:masterClrMapping/>
+  </p:clrMapOvr>
+  <p:timing>
+    <p:tnLst>
+      <p:par>
+        <p:cTn id="1" dur="indefinite" restart="never" nodeType="tmRoot"/>
+      </p:par>
+    </p:tnLst>
+  </p:timing>
+</p:sld>
+</file>
+
+<file path=ppt/slides/slide14.xml><?xml version="1.0" encoding="utf-8"?>
+<p:sld xmlns:a="http://schemas.openxmlformats.org/drawingml/2006/main" xmlns:r="http://schemas.openxmlformats.org/officeDocument/2006/relationships" xmlns:p="http://schemas.openxmlformats.org/presentationml/2006/main">
+  <p:cSld>
+    <p:spTree>
+      <p:nvGrpSpPr>
+        <p:cNvPr id="1" name=""/>
+        <p:cNvGrpSpPr/>
+        <p:nvPr/>
+      </p:nvGrpSpPr>
+      <p:grpSpPr>
+        <a:xfrm>
+          <a:off x="0" y="0"/>
+          <a:ext cx="0" cy="0"/>
+          <a:chOff x="0" y="0"/>
+          <a:chExt cx="0" cy="0"/>
+        </a:xfrm>
+      </p:grpSpPr>
+      <p:sp>
+        <p:nvSpPr>
+          <p:cNvPr id="2" name="Title 1"/>
+          <p:cNvSpPr>
+            <a:spLocks noGrp="1"/>
+          </p:cNvSpPr>
+          <p:nvPr>
+            <p:ph type="title"/>
+          </p:nvPr>
+        </p:nvSpPr>
+        <p:spPr/>
+        <p:txBody>
+          <a:bodyPr/>
+          <a:lstStyle/>
+          <a:p>
+            <a:r>
+              <a:rPr lang="en-US" dirty="0" smtClean="0"/>
+              <a:t>Making </a:t>
+            </a:r>
+            <a:r>
+              <a:rPr lang="en-US" dirty="0" err="1" smtClean="0"/>
+              <a:t>MyEasyPort</a:t>
+            </a:r>
+            <a:endParaRPr lang="en-US" dirty="0"/>
+          </a:p>
+        </p:txBody>
+      </p:sp>
+      <p:sp>
+        <p:nvSpPr>
+          <p:cNvPr id="3" name="Content Placeholder 2"/>
+          <p:cNvSpPr>
+            <a:spLocks noGrp="1"/>
+          </p:cNvSpPr>
+          <p:nvPr>
+            <p:ph idx="1"/>
+          </p:nvPr>
+        </p:nvSpPr>
+        <p:spPr/>
+        <p:txBody>
+          <a:bodyPr/>
+          <a:lstStyle/>
+          <a:p>
+            <a:r>
+              <a:rPr lang="en-US" dirty="0" smtClean="0"/>
+              <a:t>Stellaris Launchpad</a:t>
+            </a:r>
+          </a:p>
+          <a:p>
+            <a:pPr lvl="1"/>
+            <a:r>
+              <a:rPr lang="en-US" dirty="0" smtClean="0"/>
+              <a:t>Overpowered, but available</a:t>
+            </a:r>
+          </a:p>
+          <a:p>
+            <a:pPr lvl="1"/>
+            <a:r>
+              <a:rPr lang="en-US" dirty="0" smtClean="0"/>
+              <a:t>Supports the flow control EasyVeep desires</a:t>
+            </a:r>
+          </a:p>
+          <a:p>
+            <a:r>
+              <a:rPr lang="en-US" dirty="0" smtClean="0"/>
+              <a:t>Implemented the protocol</a:t>
+            </a:r>
+          </a:p>
+          <a:p>
+            <a:pPr lvl="1"/>
+            <a:r>
+              <a:rPr lang="en-US" dirty="0" smtClean="0"/>
+              <a:t>Everything talked well at low speed</a:t>
+            </a:r>
+          </a:p>
+          <a:p>
+            <a:pPr lvl="1"/>
+            <a:r>
+              <a:rPr lang="en-US" dirty="0" smtClean="0"/>
+              <a:t>Updating at more the 5Hz crashed EasyVeep!</a:t>
+            </a:r>
+          </a:p>
+          <a:p>
+            <a:pPr lvl="1"/>
+            <a:r>
+              <a:rPr lang="en-US" dirty="0" smtClean="0"/>
+              <a:t>Tried debugging EasyVeep and </a:t>
+            </a:r>
+            <a:r>
+              <a:rPr lang="en-US" dirty="0" err="1" smtClean="0"/>
+              <a:t>MyEasyPort</a:t>
+            </a:r>
+            <a:endParaRPr lang="en-US" dirty="0" smtClean="0"/>
+          </a:p>
+          <a:p>
+            <a:pPr lvl="2"/>
+            <a:r>
+              <a:rPr lang="en-US" dirty="0" smtClean="0"/>
+              <a:t>Too hard to debug without EasyVeep source</a:t>
+            </a:r>
+          </a:p>
+          <a:p>
+            <a:endParaRPr lang="en-US" dirty="0"/>
+          </a:p>
+        </p:txBody>
+      </p:sp>
+    </p:spTree>
+    <p:extLst>
+      <p:ext uri="{BB962C8B-B14F-4D97-AF65-F5344CB8AC3E}">
+        <p14:creationId xmlns:p14="http://schemas.microsoft.com/office/powerpoint/2010/main" val="1059332838"/>
+      </p:ext>
+    </p:extLst>
+  </p:cSld>
+  <p:clrMapOvr>
+    <a:masterClrMapping/>
+  </p:clrMapOvr>
+  <p:timing>
+    <p:tnLst>
+      <p:par>
+        <p:cTn id="1" dur="indefinite" restart="never" nodeType="tmRoot"/>
+      </p:par>
+    </p:tnLst>
+  </p:timing>
+</p:sld>
+</file>
+
+<file path=ppt/slides/slide15.xml><?xml version="1.0" encoding="utf-8"?>
+<p:sld xmlns:a="http://schemas.openxmlformats.org/drawingml/2006/main" xmlns:r="http://schemas.openxmlformats.org/officeDocument/2006/relationships" xmlns:p="http://schemas.openxmlformats.org/presentationml/2006/main">
+  <p:cSld>
+    <p:spTree>
+      <p:nvGrpSpPr>
+        <p:cNvPr id="1" name=""/>
+        <p:cNvGrpSpPr/>
+        <p:nvPr/>
+      </p:nvGrpSpPr>
+      <p:grpSpPr>
+        <a:xfrm>
+          <a:off x="0" y="0"/>
+          <a:ext cx="0" cy="0"/>
+          <a:chOff x="0" y="0"/>
+          <a:chExt cx="0" cy="0"/>
+        </a:xfrm>
+      </p:grpSpPr>
+      <p:sp>
+        <p:nvSpPr>
+          <p:cNvPr id="2" name="Title 1"/>
+          <p:cNvSpPr>
+            <a:spLocks noGrp="1"/>
+          </p:cNvSpPr>
+          <p:nvPr>
+            <p:ph type="title"/>
+          </p:nvPr>
+        </p:nvSpPr>
+        <p:spPr/>
+        <p:txBody>
+          <a:bodyPr/>
+          <a:lstStyle/>
+          <a:p>
+            <a:r>
+              <a:rPr lang="en-US" dirty="0" err="1" smtClean="0"/>
+              <a:t>MyEasyVeep</a:t>
+            </a:r>
+            <a:endParaRPr lang="en-US" dirty="0"/>
+          </a:p>
+        </p:txBody>
+      </p:sp>
+      <p:sp>
+        <p:nvSpPr>
+          <p:cNvPr id="3" name="Content Placeholder 2"/>
+          <p:cNvSpPr>
+            <a:spLocks noGrp="1"/>
+          </p:cNvSpPr>
+          <p:nvPr>
+            <p:ph idx="1"/>
+          </p:nvPr>
+        </p:nvSpPr>
+        <p:spPr/>
+        <p:txBody>
+          <a:bodyPr>
+            <a:normAutofit lnSpcReduction="10000"/>
+          </a:bodyPr>
+          <a:lstStyle/>
+          <a:p>
+            <a:r>
+              <a:rPr lang="en-US" dirty="0" smtClean="0"/>
+              <a:t>EasyVeep simulations are just flash movies</a:t>
+            </a:r>
+          </a:p>
+          <a:p>
+            <a:pPr lvl="1"/>
+            <a:r>
+              <a:rPr lang="en-US" dirty="0" smtClean="0"/>
+              <a:t>Copied the flash movies into my own project</a:t>
+            </a:r>
+          </a:p>
+          <a:p>
+            <a:r>
+              <a:rPr lang="en-US" dirty="0" smtClean="0"/>
+              <a:t>Using Flash ActiveX control to load and play</a:t>
+            </a:r>
+          </a:p>
+          <a:p>
+            <a:r>
+              <a:rPr lang="en-US" dirty="0" smtClean="0"/>
+              <a:t>How do I interact with the movie?</a:t>
+            </a:r>
+          </a:p>
+          <a:p>
+            <a:pPr lvl="1"/>
+            <a:r>
+              <a:rPr lang="en-US" dirty="0" smtClean="0"/>
+              <a:t>Decompile the </a:t>
+            </a:r>
+            <a:r>
+              <a:rPr lang="en-US" dirty="0" err="1" smtClean="0"/>
+              <a:t>swf</a:t>
+            </a:r>
+            <a:endParaRPr lang="en-US" dirty="0" smtClean="0"/>
+          </a:p>
+          <a:p>
+            <a:pPr lvl="2"/>
+            <a:r>
+              <a:rPr lang="en-US" dirty="0" err="1" smtClean="0"/>
+              <a:t>Sothink</a:t>
+            </a:r>
+            <a:r>
+              <a:rPr lang="en-US" dirty="0" smtClean="0"/>
+              <a:t> Flash </a:t>
+            </a:r>
+            <a:r>
+              <a:rPr lang="en-US" dirty="0" err="1" smtClean="0"/>
+              <a:t>Decompiler</a:t>
+            </a:r>
+            <a:r>
+              <a:rPr lang="en-US" dirty="0" smtClean="0"/>
+              <a:t> (trial)</a:t>
+            </a:r>
+          </a:p>
+          <a:p>
+            <a:pPr lvl="2"/>
+            <a:r>
+              <a:rPr lang="en-US" dirty="0" err="1"/>
+              <a:t>f</a:t>
+            </a:r>
+            <a:r>
+              <a:rPr lang="en-US" dirty="0" err="1" smtClean="0"/>
+              <a:t>lasm</a:t>
+            </a:r>
+            <a:r>
+              <a:rPr lang="en-US" dirty="0" smtClean="0"/>
+              <a:t> –d</a:t>
+            </a:r>
+          </a:p>
+          <a:p>
+            <a:pPr lvl="1"/>
+            <a:r>
+              <a:rPr lang="en-US" dirty="0" smtClean="0"/>
+              <a:t>Look through the disassembly to find variable names</a:t>
+            </a:r>
+          </a:p>
+        </p:txBody>
+      </p:sp>
+    </p:spTree>
+    <p:extLst>
+      <p:ext uri="{BB962C8B-B14F-4D97-AF65-F5344CB8AC3E}">
+        <p14:creationId xmlns:p14="http://schemas.microsoft.com/office/powerpoint/2010/main" val="3338952488"/>
+      </p:ext>
+    </p:extLst>
+  </p:cSld>
+  <p:clrMapOvr>
+    <a:masterClrMapping/>
+  </p:clrMapOvr>
+  <p:timing>
+    <p:tnLst>
+      <p:par>
+        <p:cTn id="1" dur="indefinite" restart="never" nodeType="tmRoot"/>
+      </p:par>
+    </p:tnLst>
+  </p:timing>
+</p:sld>
+</file>
+
+<file path=ppt/slides/slide16.xml><?xml version="1.0" encoding="utf-8"?>
+<p:sld xmlns:a="http://schemas.openxmlformats.org/drawingml/2006/main" xmlns:r="http://schemas.openxmlformats.org/officeDocument/2006/relationships" xmlns:p="http://schemas.openxmlformats.org/presentationml/2006/main">
+  <p:cSld>
+    <p:spTree>
+      <p:nvGrpSpPr>
+        <p:cNvPr id="1" name=""/>
+        <p:cNvGrpSpPr/>
+        <p:nvPr/>
+      </p:nvGrpSpPr>
+      <p:grpSpPr>
+        <a:xfrm>
+          <a:off x="0" y="0"/>
+          <a:ext cx="0" cy="0"/>
+          <a:chOff x="0" y="0"/>
+          <a:chExt cx="0" cy="0"/>
+        </a:xfrm>
+      </p:grpSpPr>
+      <p:sp>
+        <p:nvSpPr>
+          <p:cNvPr id="2" name="Title 1"/>
+          <p:cNvSpPr>
+            <a:spLocks noGrp="1"/>
+          </p:cNvSpPr>
+          <p:nvPr>
+            <p:ph type="title"/>
+          </p:nvPr>
+        </p:nvSpPr>
+        <p:spPr/>
+        <p:txBody>
+          <a:bodyPr/>
+          <a:lstStyle/>
+          <a:p>
+            <a:r>
+              <a:rPr lang="en-US" dirty="0" err="1" smtClean="0"/>
+              <a:t>MyEasyVeep</a:t>
+            </a:r>
+            <a:r>
+              <a:rPr lang="en-US" dirty="0" smtClean="0"/>
+              <a:t> (2)</a:t>
+            </a:r>
+            <a:endParaRPr lang="en-US" dirty="0"/>
+          </a:p>
+        </p:txBody>
+      </p:sp>
+      <p:sp>
+        <p:nvSpPr>
+          <p:cNvPr id="3" name="Content Placeholder 2"/>
+          <p:cNvSpPr>
+            <a:spLocks noGrp="1"/>
+          </p:cNvSpPr>
+          <p:nvPr>
+            <p:ph idx="1"/>
+          </p:nvPr>
+        </p:nvSpPr>
+        <p:spPr>
+          <a:xfrm>
+            <a:off x="457200" y="1600200"/>
+            <a:ext cx="8229600" cy="1828799"/>
+          </a:xfrm>
+        </p:spPr>
+        <p:txBody>
+          <a:bodyPr>
+            <a:normAutofit fontScale="92500" lnSpcReduction="20000"/>
+          </a:bodyPr>
+          <a:lstStyle/>
+          <a:p>
+            <a:r>
+              <a:rPr lang="en-US" dirty="0" smtClean="0"/>
+              <a:t>Sort through all the variable names to find the useful ones.</a:t>
+            </a:r>
+          </a:p>
+          <a:p>
+            <a:pPr marL="0" indent="0">
+              <a:buNone/>
+            </a:pPr>
+            <a:endParaRPr lang="en-US" dirty="0" smtClean="0"/>
+          </a:p>
+          <a:p>
+            <a:r>
+              <a:rPr lang="en-US" dirty="0" smtClean="0"/>
+              <a:t>Use ActiveX </a:t>
+            </a:r>
+            <a:r>
+              <a:rPr lang="en-US" dirty="0" err="1" smtClean="0"/>
+              <a:t>GetVariable</a:t>
+            </a:r>
+            <a:r>
+              <a:rPr lang="en-US" dirty="0" smtClean="0"/>
+              <a:t> and </a:t>
+            </a:r>
+            <a:r>
+              <a:rPr lang="en-US" dirty="0" err="1" smtClean="0"/>
+              <a:t>SetVariable</a:t>
+            </a:r>
+            <a:r>
+              <a:rPr lang="en-US" dirty="0" smtClean="0"/>
+              <a:t> methods</a:t>
+            </a:r>
+            <a:endParaRPr lang="en-US" dirty="0"/>
+          </a:p>
+        </p:txBody>
+      </p:sp>
+      <p:graphicFrame>
+        <p:nvGraphicFramePr>
+          <p:cNvPr id="5" name="Table 4"/>
+          <p:cNvGraphicFramePr>
+            <a:graphicFrameLocks noGrp="1"/>
+          </p:cNvGraphicFramePr>
+          <p:nvPr>
+            <p:extLst>
+              <p:ext uri="{D42A27DB-BD31-4B8C-83A1-F6EECF244321}">
+                <p14:modId xmlns:p14="http://schemas.microsoft.com/office/powerpoint/2010/main" val="1735624918"/>
+              </p:ext>
+            </p:extLst>
+          </p:nvPr>
+        </p:nvGraphicFramePr>
+        <p:xfrm>
+          <a:off x="457200" y="3733800"/>
+          <a:ext cx="8229600" cy="2175964"/>
+        </p:xfrm>
+        <a:graphic>
+          <a:graphicData uri="http://schemas.openxmlformats.org/drawingml/2006/table">
+            <a:tbl>
+              <a:tblPr firstRow="1" firstCol="1" bandRow="1">
+                <a:tableStyleId>{5C22544A-7EE6-4342-B048-85BDC9FD1C3A}</a:tableStyleId>
+              </a:tblPr>
+              <a:tblGrid>
+                <a:gridCol w="4114800"/>
+                <a:gridCol w="4114800"/>
+              </a:tblGrid>
+              <a:tr h="310852">
+                <a:tc>
+                  <a:txBody>
+                    <a:bodyPr/>
+                    <a:lstStyle/>
+                    <a:p>
+                      <a:pPr marL="0" marR="0" algn="ctr">
+                        <a:lnSpc>
+                          <a:spcPts val="1650"/>
+                        </a:lnSpc>
+                        <a:spcBef>
+                          <a:spcPts val="0"/>
+                        </a:spcBef>
+                        <a:spcAft>
+                          <a:spcPts val="0"/>
+                        </a:spcAft>
+                      </a:pPr>
+                      <a:r>
+                        <a:rPr lang="en-US" sz="1100" dirty="0">
+                          <a:effectLst/>
+                        </a:rPr>
+                        <a:t>Variable Name</a:t>
+                      </a:r>
+                      <a:endParaRPr lang="en-US" sz="1100" dirty="0">
+                        <a:effectLst/>
+                        <a:latin typeface="Calibri"/>
+                        <a:ea typeface="SimSun"/>
+                        <a:cs typeface="Times New Roman"/>
+                      </a:endParaRPr>
+                    </a:p>
+                  </a:txBody>
+                  <a:tcPr marL="68580" marR="68580" marT="0" marB="0"/>
+                </a:tc>
+                <a:tc>
+                  <a:txBody>
+                    <a:bodyPr/>
+                    <a:lstStyle/>
+                    <a:p>
+                      <a:pPr marL="0" marR="0" algn="ctr">
+                        <a:lnSpc>
+                          <a:spcPts val="1650"/>
+                        </a:lnSpc>
+                        <a:spcBef>
+                          <a:spcPts val="0"/>
+                        </a:spcBef>
+                        <a:spcAft>
+                          <a:spcPts val="0"/>
+                        </a:spcAft>
+                      </a:pPr>
+                      <a:r>
+                        <a:rPr lang="en-US" sz="1100">
+                          <a:effectLst/>
+                        </a:rPr>
+                        <a:t>Purpose</a:t>
+                      </a:r>
+                      <a:endParaRPr lang="en-US" sz="1100">
+                        <a:effectLst/>
+                        <a:latin typeface="Calibri"/>
+                        <a:ea typeface="SimSun"/>
+                        <a:cs typeface="Times New Roman"/>
+                      </a:endParaRPr>
+                    </a:p>
+                  </a:txBody>
+                  <a:tcPr marL="68580" marR="68580" marT="0" marB="0"/>
+                </a:tc>
+              </a:tr>
+              <a:tr h="310852">
+                <a:tc>
+                  <a:txBody>
+                    <a:bodyPr/>
+                    <a:lstStyle/>
+                    <a:p>
+                      <a:pPr marL="0" marR="0">
+                        <a:lnSpc>
+                          <a:spcPts val="1650"/>
+                        </a:lnSpc>
+                        <a:spcBef>
+                          <a:spcPts val="0"/>
+                        </a:spcBef>
+                        <a:spcAft>
+                          <a:spcPts val="0"/>
+                        </a:spcAft>
+                      </a:pPr>
+                      <a:r>
+                        <a:rPr lang="en-US" sz="1100">
+                          <a:effectLst/>
+                        </a:rPr>
+                        <a:t>EprgName</a:t>
+                      </a:r>
+                      <a:endParaRPr lang="en-US" sz="1100">
+                        <a:effectLst/>
+                        <a:latin typeface="Calibri"/>
+                        <a:ea typeface="SimSun"/>
+                        <a:cs typeface="Times New Roman"/>
+                      </a:endParaRPr>
+                    </a:p>
+                  </a:txBody>
+                  <a:tcPr marL="68580" marR="68580" marT="0" marB="0"/>
+                </a:tc>
+                <a:tc>
+                  <a:txBody>
+                    <a:bodyPr/>
+                    <a:lstStyle/>
+                    <a:p>
+                      <a:pPr marL="0" marR="0">
+                        <a:lnSpc>
+                          <a:spcPts val="1650"/>
+                        </a:lnSpc>
+                        <a:spcBef>
+                          <a:spcPts val="0"/>
+                        </a:spcBef>
+                        <a:spcAft>
+                          <a:spcPts val="0"/>
+                        </a:spcAft>
+                      </a:pPr>
+                      <a:r>
+                        <a:rPr lang="en-US" sz="1100">
+                          <a:effectLst/>
+                        </a:rPr>
+                        <a:t>English Program Name</a:t>
+                      </a:r>
+                      <a:endParaRPr lang="en-US" sz="1100">
+                        <a:effectLst/>
+                        <a:latin typeface="Calibri"/>
+                        <a:ea typeface="SimSun"/>
+                        <a:cs typeface="Times New Roman"/>
+                      </a:endParaRPr>
+                    </a:p>
+                  </a:txBody>
+                  <a:tcPr marL="68580" marR="68580" marT="0" marB="0"/>
+                </a:tc>
+              </a:tr>
+              <a:tr h="310852">
+                <a:tc>
+                  <a:txBody>
+                    <a:bodyPr/>
+                    <a:lstStyle/>
+                    <a:p>
+                      <a:pPr marL="0" marR="0">
+                        <a:lnSpc>
+                          <a:spcPts val="1650"/>
+                        </a:lnSpc>
+                        <a:spcBef>
+                          <a:spcPts val="0"/>
+                        </a:spcBef>
+                        <a:spcAft>
+                          <a:spcPts val="0"/>
+                        </a:spcAft>
+                      </a:pPr>
+                      <a:r>
+                        <a:rPr lang="en-US" sz="1100">
+                          <a:effectLst/>
+                        </a:rPr>
+                        <a:t>EprgLeirasX</a:t>
+                      </a:r>
+                      <a:endParaRPr lang="en-US" sz="1100">
+                        <a:effectLst/>
+                        <a:latin typeface="Calibri"/>
+                        <a:ea typeface="SimSun"/>
+                        <a:cs typeface="Times New Roman"/>
+                      </a:endParaRPr>
+                    </a:p>
+                  </a:txBody>
+                  <a:tcPr marL="68580" marR="68580" marT="0" marB="0"/>
+                </a:tc>
+                <a:tc>
+                  <a:txBody>
+                    <a:bodyPr/>
+                    <a:lstStyle/>
+                    <a:p>
+                      <a:pPr marL="0" marR="0">
+                        <a:lnSpc>
+                          <a:spcPts val="1650"/>
+                        </a:lnSpc>
+                        <a:spcBef>
+                          <a:spcPts val="0"/>
+                        </a:spcBef>
+                        <a:spcAft>
+                          <a:spcPts val="0"/>
+                        </a:spcAft>
+                      </a:pPr>
+                      <a:r>
+                        <a:rPr lang="en-US" sz="1100">
+                          <a:effectLst/>
+                        </a:rPr>
+                        <a:t>English Program Description ( X = 0..10)</a:t>
+                      </a:r>
+                      <a:endParaRPr lang="en-US" sz="1100">
+                        <a:effectLst/>
+                        <a:latin typeface="Calibri"/>
+                        <a:ea typeface="SimSun"/>
+                        <a:cs typeface="Times New Roman"/>
+                      </a:endParaRPr>
+                    </a:p>
+                  </a:txBody>
+                  <a:tcPr marL="68580" marR="68580" marT="0" marB="0"/>
+                </a:tc>
+              </a:tr>
+              <a:tr h="310852">
+                <a:tc>
+                  <a:txBody>
+                    <a:bodyPr/>
+                    <a:lstStyle/>
+                    <a:p>
+                      <a:pPr marL="0" marR="0">
+                        <a:lnSpc>
+                          <a:spcPts val="1650"/>
+                        </a:lnSpc>
+                        <a:spcBef>
+                          <a:spcPts val="0"/>
+                        </a:spcBef>
+                        <a:spcAft>
+                          <a:spcPts val="0"/>
+                        </a:spcAft>
+                      </a:pPr>
+                      <a:r>
+                        <a:rPr lang="en-US" sz="1100">
+                          <a:effectLst/>
+                        </a:rPr>
+                        <a:t>EDigSensX</a:t>
+                      </a:r>
+                      <a:endParaRPr lang="en-US" sz="1100">
+                        <a:effectLst/>
+                        <a:latin typeface="Calibri"/>
+                        <a:ea typeface="SimSun"/>
+                        <a:cs typeface="Times New Roman"/>
+                      </a:endParaRPr>
+                    </a:p>
+                  </a:txBody>
+                  <a:tcPr marL="68580" marR="68580" marT="0" marB="0"/>
+                </a:tc>
+                <a:tc>
+                  <a:txBody>
+                    <a:bodyPr/>
+                    <a:lstStyle/>
+                    <a:p>
+                      <a:pPr marL="0" marR="0">
+                        <a:lnSpc>
+                          <a:spcPts val="1650"/>
+                        </a:lnSpc>
+                        <a:spcBef>
+                          <a:spcPts val="0"/>
+                        </a:spcBef>
+                        <a:spcAft>
+                          <a:spcPts val="0"/>
+                        </a:spcAft>
+                      </a:pPr>
+                      <a:r>
+                        <a:rPr lang="en-US" sz="1100">
+                          <a:effectLst/>
+                        </a:rPr>
+                        <a:t>English Sensor Description ( X = 1..16)</a:t>
+                      </a:r>
+                      <a:endParaRPr lang="en-US" sz="1100">
+                        <a:effectLst/>
+                        <a:latin typeface="Calibri"/>
+                        <a:ea typeface="SimSun"/>
+                        <a:cs typeface="Times New Roman"/>
+                      </a:endParaRPr>
+                    </a:p>
+                  </a:txBody>
+                  <a:tcPr marL="68580" marR="68580" marT="0" marB="0"/>
+                </a:tc>
+              </a:tr>
+              <a:tr h="310852">
+                <a:tc>
+                  <a:txBody>
+                    <a:bodyPr/>
+                    <a:lstStyle/>
+                    <a:p>
+                      <a:pPr marL="0" marR="0">
+                        <a:lnSpc>
+                          <a:spcPts val="1650"/>
+                        </a:lnSpc>
+                        <a:spcBef>
+                          <a:spcPts val="0"/>
+                        </a:spcBef>
+                        <a:spcAft>
+                          <a:spcPts val="0"/>
+                        </a:spcAft>
+                      </a:pPr>
+                      <a:r>
+                        <a:rPr lang="en-US" sz="1100">
+                          <a:effectLst/>
+                        </a:rPr>
+                        <a:t>EDigActX</a:t>
+                      </a:r>
+                      <a:endParaRPr lang="en-US" sz="1100">
+                        <a:effectLst/>
+                        <a:latin typeface="Calibri"/>
+                        <a:ea typeface="SimSun"/>
+                        <a:cs typeface="Times New Roman"/>
+                      </a:endParaRPr>
+                    </a:p>
+                  </a:txBody>
+                  <a:tcPr marL="68580" marR="68580" marT="0" marB="0"/>
+                </a:tc>
+                <a:tc>
+                  <a:txBody>
+                    <a:bodyPr/>
+                    <a:lstStyle/>
+                    <a:p>
+                      <a:pPr marL="0" marR="0">
+                        <a:lnSpc>
+                          <a:spcPts val="1650"/>
+                        </a:lnSpc>
+                        <a:spcBef>
+                          <a:spcPts val="0"/>
+                        </a:spcBef>
+                        <a:spcAft>
+                          <a:spcPts val="0"/>
+                        </a:spcAft>
+                      </a:pPr>
+                      <a:r>
+                        <a:rPr lang="en-US" sz="1100">
+                          <a:effectLst/>
+                        </a:rPr>
+                        <a:t>English Actuator Description (X = 1..16)</a:t>
+                      </a:r>
+                      <a:endParaRPr lang="en-US" sz="1100">
+                        <a:effectLst/>
+                        <a:latin typeface="Calibri"/>
+                        <a:ea typeface="SimSun"/>
+                        <a:cs typeface="Times New Roman"/>
+                      </a:endParaRPr>
+                    </a:p>
+                  </a:txBody>
+                  <a:tcPr marL="68580" marR="68580" marT="0" marB="0"/>
+                </a:tc>
+              </a:tr>
+              <a:tr h="310852">
+                <a:tc>
+                  <a:txBody>
+                    <a:bodyPr/>
+                    <a:lstStyle/>
+                    <a:p>
+                      <a:pPr marL="0" marR="0">
+                        <a:lnSpc>
+                          <a:spcPts val="1650"/>
+                        </a:lnSpc>
+                        <a:spcBef>
+                          <a:spcPts val="0"/>
+                        </a:spcBef>
+                        <a:spcAft>
+                          <a:spcPts val="0"/>
+                        </a:spcAft>
+                      </a:pPr>
+                      <a:r>
+                        <a:rPr lang="en-US" sz="1100">
+                          <a:effectLst/>
+                        </a:rPr>
+                        <a:t>DAX Digital</a:t>
+                      </a:r>
+                      <a:endParaRPr lang="en-US" sz="1100">
+                        <a:effectLst/>
+                        <a:latin typeface="Calibri"/>
+                        <a:ea typeface="SimSun"/>
+                        <a:cs typeface="Times New Roman"/>
+                      </a:endParaRPr>
+                    </a:p>
+                  </a:txBody>
+                  <a:tcPr marL="68580" marR="68580" marT="0" marB="0"/>
+                </a:tc>
+                <a:tc>
+                  <a:txBody>
+                    <a:bodyPr/>
+                    <a:lstStyle/>
+                    <a:p>
+                      <a:pPr marL="0" marR="0">
+                        <a:lnSpc>
+                          <a:spcPts val="1650"/>
+                        </a:lnSpc>
+                        <a:spcBef>
+                          <a:spcPts val="0"/>
+                        </a:spcBef>
+                        <a:spcAft>
+                          <a:spcPts val="0"/>
+                        </a:spcAft>
+                      </a:pPr>
+                      <a:r>
+                        <a:rPr lang="en-US" sz="1100">
+                          <a:effectLst/>
+                        </a:rPr>
+                        <a:t>Actuator Value ( X =1..16)</a:t>
+                      </a:r>
+                      <a:endParaRPr lang="en-US" sz="1100">
+                        <a:effectLst/>
+                        <a:latin typeface="Calibri"/>
+                        <a:ea typeface="SimSun"/>
+                        <a:cs typeface="Times New Roman"/>
+                      </a:endParaRPr>
+                    </a:p>
+                  </a:txBody>
+                  <a:tcPr marL="68580" marR="68580" marT="0" marB="0"/>
+                </a:tc>
+              </a:tr>
+              <a:tr h="310852">
+                <a:tc>
+                  <a:txBody>
+                    <a:bodyPr/>
+                    <a:lstStyle/>
+                    <a:p>
+                      <a:pPr marL="0" marR="0">
+                        <a:lnSpc>
+                          <a:spcPts val="1650"/>
+                        </a:lnSpc>
+                        <a:spcBef>
+                          <a:spcPts val="0"/>
+                        </a:spcBef>
+                        <a:spcAft>
+                          <a:spcPts val="0"/>
+                        </a:spcAft>
+                      </a:pPr>
+                      <a:r>
+                        <a:rPr lang="en-US" sz="1100">
+                          <a:effectLst/>
+                        </a:rPr>
+                        <a:t>DSX Digital</a:t>
+                      </a:r>
+                      <a:endParaRPr lang="en-US" sz="1100">
+                        <a:effectLst/>
+                        <a:latin typeface="Calibri"/>
+                        <a:ea typeface="SimSun"/>
+                        <a:cs typeface="Times New Roman"/>
+                      </a:endParaRPr>
+                    </a:p>
+                  </a:txBody>
+                  <a:tcPr marL="68580" marR="68580" marT="0" marB="0"/>
+                </a:tc>
+                <a:tc>
+                  <a:txBody>
+                    <a:bodyPr/>
+                    <a:lstStyle/>
+                    <a:p>
+                      <a:pPr marL="0" marR="0">
+                        <a:lnSpc>
+                          <a:spcPts val="1650"/>
+                        </a:lnSpc>
+                        <a:spcBef>
+                          <a:spcPts val="0"/>
+                        </a:spcBef>
+                        <a:spcAft>
+                          <a:spcPts val="0"/>
+                        </a:spcAft>
+                      </a:pPr>
+                      <a:r>
+                        <a:rPr lang="en-US" sz="1100" dirty="0">
+                          <a:effectLst/>
+                        </a:rPr>
+                        <a:t>Sensor Value (X=1..16)</a:t>
+                      </a:r>
+                      <a:endParaRPr lang="en-US" sz="1100" dirty="0">
+                        <a:effectLst/>
+                        <a:latin typeface="Calibri"/>
+                        <a:ea typeface="SimSun"/>
+                        <a:cs typeface="Times New Roman"/>
+                      </a:endParaRPr>
+                    </a:p>
+                  </a:txBody>
+                  <a:tcPr marL="68580" marR="68580" marT="0" marB="0"/>
+                </a:tc>
+              </a:tr>
+            </a:tbl>
+          </a:graphicData>
+        </a:graphic>
+      </p:graphicFrame>
+    </p:spTree>
+    <p:extLst>
+      <p:ext uri="{BB962C8B-B14F-4D97-AF65-F5344CB8AC3E}">
+        <p14:creationId xmlns:p14="http://schemas.microsoft.com/office/powerpoint/2010/main" val="3611499960"/>
+      </p:ext>
+    </p:extLst>
+  </p:cSld>
+  <p:clrMapOvr>
+    <a:masterClrMapping/>
+  </p:clrMapOvr>
+  <p:timing>
+    <p:tnLst>
+      <p:par>
+        <p:cTn id="1" dur="indefinite" restart="never" nodeType="tmRoot"/>
+      </p:par>
+    </p:tnLst>
+  </p:timing>
+</p:sld>
+</file>
+
+<file path=ppt/slides/slide17.xml><?xml version="1.0" encoding="utf-8"?>
+<p:sld xmlns:a="http://schemas.openxmlformats.org/drawingml/2006/main" xmlns:r="http://schemas.openxmlformats.org/officeDocument/2006/relationships" xmlns:p="http://schemas.openxmlformats.org/presentationml/2006/main">
+  <p:cSld>
+    <p:spTree>
+      <p:nvGrpSpPr>
+        <p:cNvPr id="1" name=""/>
+        <p:cNvGrpSpPr/>
+        <p:nvPr/>
+      </p:nvGrpSpPr>
+      <p:grpSpPr>
+        <a:xfrm>
+          <a:off x="0" y="0"/>
+          <a:ext cx="0" cy="0"/>
+          <a:chOff x="0" y="0"/>
+          <a:chExt cx="0" cy="0"/>
+        </a:xfrm>
+      </p:grpSpPr>
+      <p:sp>
+        <p:nvSpPr>
+          <p:cNvPr id="2" name="Title 1"/>
+          <p:cNvSpPr>
+            <a:spLocks noGrp="1"/>
+          </p:cNvSpPr>
+          <p:nvPr>
+            <p:ph type="title"/>
+          </p:nvPr>
+        </p:nvSpPr>
+        <p:spPr/>
+        <p:txBody>
+          <a:bodyPr/>
+          <a:lstStyle/>
+          <a:p>
+            <a:r>
+              <a:rPr lang="en-US" dirty="0" err="1" smtClean="0"/>
+              <a:t>MyEasyVeep</a:t>
+            </a:r>
+            <a:r>
+              <a:rPr lang="en-US" dirty="0" smtClean="0"/>
+              <a:t> (3)</a:t>
+            </a:r>
+            <a:endParaRPr lang="en-US" dirty="0"/>
+          </a:p>
+        </p:txBody>
+      </p:sp>
+      <p:sp>
+        <p:nvSpPr>
+          <p:cNvPr id="3" name="Content Placeholder 2"/>
+          <p:cNvSpPr>
+            <a:spLocks noGrp="1"/>
+          </p:cNvSpPr>
+          <p:nvPr>
+            <p:ph idx="1"/>
+          </p:nvPr>
+        </p:nvSpPr>
+        <p:spPr/>
+        <p:txBody>
+          <a:bodyPr/>
+          <a:lstStyle/>
+          <a:p>
+            <a:r>
+              <a:rPr lang="en-US" dirty="0" smtClean="0"/>
+              <a:t>Queried simulation at twice the frame rate</a:t>
+            </a:r>
+          </a:p>
+          <a:p>
+            <a:r>
+              <a:rPr lang="en-US" dirty="0" smtClean="0"/>
+              <a:t>If sensor values changed, command would be sent to connected EasyPort</a:t>
+            </a:r>
+          </a:p>
+          <a:p>
+            <a:r>
+              <a:rPr lang="en-US" dirty="0" smtClean="0"/>
+              <a:t>On Update command from </a:t>
+            </a:r>
+            <a:r>
+              <a:rPr lang="en-US" dirty="0" err="1" smtClean="0"/>
+              <a:t>MyEasyPort</a:t>
+            </a:r>
+            <a:r>
+              <a:rPr lang="en-US" dirty="0" smtClean="0"/>
+              <a:t> actuator variables would be set in </a:t>
+            </a:r>
+            <a:r>
+              <a:rPr lang="en-US" dirty="0" err="1" smtClean="0"/>
+              <a:t>swf</a:t>
+            </a:r>
+            <a:endParaRPr lang="en-US" dirty="0" smtClean="0"/>
+          </a:p>
+          <a:p>
+            <a:r>
+              <a:rPr lang="en-US" dirty="0" smtClean="0"/>
+              <a:t>User can also interact with buttons on GUI</a:t>
+            </a:r>
+          </a:p>
+          <a:p>
+            <a:r>
+              <a:rPr lang="en-US" dirty="0" smtClean="0"/>
+              <a:t>Auto – mode shows user how system should work when controlled correctly</a:t>
+            </a:r>
+            <a:endParaRPr lang="en-US" dirty="0"/>
+          </a:p>
+        </p:txBody>
+      </p:sp>
+    </p:spTree>
+    <p:extLst>
+      <p:ext uri="{BB962C8B-B14F-4D97-AF65-F5344CB8AC3E}">
+        <p14:creationId xmlns:p14="http://schemas.microsoft.com/office/powerpoint/2010/main" val="3956683239"/>
+      </p:ext>
+    </p:extLst>
+  </p:cSld>
+  <p:clrMapOvr>
+    <a:masterClrMapping/>
+  </p:clrMapOvr>
+  <p:timing>
+    <p:tnLst>
+      <p:par>
+        <p:cTn id="1" dur="indefinite" restart="never" nodeType="tmRoot"/>
+      </p:par>
+    </p:tnLst>
+  </p:timing>
+</p:sld>
+</file>
+
+<file path=ppt/slides/slide18.xml><?xml version="1.0" encoding="utf-8"?>
+<p:sld xmlns:a="http://schemas.openxmlformats.org/drawingml/2006/main" xmlns:r="http://schemas.openxmlformats.org/officeDocument/2006/relationships" xmlns:p="http://schemas.openxmlformats.org/presentationml/2006/main">
+  <p:cSld>
+    <p:spTree>
+      <p:nvGrpSpPr>
+        <p:cNvPr id="1" name=""/>
+        <p:cNvGrpSpPr/>
+        <p:nvPr/>
+      </p:nvGrpSpPr>
+      <p:grpSpPr>
+        <a:xfrm>
+          <a:off x="0" y="0"/>
+          <a:ext cx="0" cy="0"/>
+          <a:chOff x="0" y="0"/>
+          <a:chExt cx="0" cy="0"/>
+        </a:xfrm>
+      </p:grpSpPr>
+      <p:sp>
+        <p:nvSpPr>
+          <p:cNvPr id="2" name="Title 1"/>
+          <p:cNvSpPr>
+            <a:spLocks noGrp="1"/>
+          </p:cNvSpPr>
+          <p:nvPr>
+            <p:ph type="title"/>
+          </p:nvPr>
+        </p:nvSpPr>
+        <p:spPr/>
+        <p:txBody>
+          <a:bodyPr/>
+          <a:lstStyle/>
+          <a:p>
+            <a:r>
+              <a:rPr lang="en-US" dirty="0" err="1" smtClean="0"/>
+              <a:t>MyEasyVeep</a:t>
+            </a:r>
+            <a:r>
+              <a:rPr lang="en-US" dirty="0" smtClean="0"/>
+              <a:t> (4)</a:t>
+            </a:r>
+            <a:endParaRPr lang="en-US" dirty="0"/>
+          </a:p>
+        </p:txBody>
+      </p:sp>
+      <p:pic>
+        <p:nvPicPr>
+          <p:cNvPr id="4" name="Content Placeholder 3"/>
+          <p:cNvPicPr>
+            <a:picLocks noGrp="1"/>
+          </p:cNvPicPr>
+          <p:nvPr>
+            <p:ph idx="1"/>
+          </p:nvPr>
+        </p:nvPicPr>
+        <p:blipFill>
+          <a:blip r:embed="rId2"/>
+          <a:stretch>
+            <a:fillRect/>
+          </a:stretch>
+        </p:blipFill>
+        <p:spPr>
+          <a:xfrm>
+            <a:off x="695315" y="1600200"/>
+            <a:ext cx="7753369" cy="4525963"/>
+          </a:xfrm>
+          <a:prstGeom prst="rect">
+            <a:avLst/>
+          </a:prstGeom>
+        </p:spPr>
+      </p:pic>
+    </p:spTree>
+    <p:extLst>
+      <p:ext uri="{BB962C8B-B14F-4D97-AF65-F5344CB8AC3E}">
+        <p14:creationId xmlns:p14="http://schemas.microsoft.com/office/powerpoint/2010/main" val="2309760077"/>
+      </p:ext>
+    </p:extLst>
+  </p:cSld>
+  <p:clrMapOvr>
+    <a:masterClrMapping/>
+  </p:clrMapOvr>
+  <p:timing>
+    <p:tnLst>
+      <p:par>
+        <p:cTn id="1" dur="indefinite" restart="never" nodeType="tmRoot"/>
+      </p:par>
+    </p:tnLst>
+  </p:timing>
+</p:sld>
+</file>
+
+<file path=ppt/slides/slide19.xml><?xml version="1.0" encoding="utf-8"?>
+<p:sld xmlns:a="http://schemas.openxmlformats.org/drawingml/2006/main" xmlns:r="http://schemas.openxmlformats.org/officeDocument/2006/relationships" xmlns:p="http://schemas.openxmlformats.org/presentationml/2006/main">
+  <p:cSld>
+    <p:spTree>
+      <p:nvGrpSpPr>
+        <p:cNvPr id="1" name=""/>
+        <p:cNvGrpSpPr/>
+        <p:nvPr/>
+      </p:nvGrpSpPr>
+      <p:grpSpPr>
+        <a:xfrm>
+          <a:off x="0" y="0"/>
+          <a:ext cx="0" cy="0"/>
+          <a:chOff x="0" y="0"/>
+          <a:chExt cx="0" cy="0"/>
+        </a:xfrm>
+      </p:grpSpPr>
+      <p:sp>
+        <p:nvSpPr>
+          <p:cNvPr id="2" name="Title 1"/>
+          <p:cNvSpPr>
+            <a:spLocks noGrp="1"/>
+          </p:cNvSpPr>
+          <p:nvPr>
+            <p:ph type="title"/>
+          </p:nvPr>
+        </p:nvSpPr>
+        <p:spPr/>
+        <p:txBody>
+          <a:bodyPr/>
+          <a:lstStyle/>
+          <a:p>
+            <a:r>
+              <a:rPr lang="en-US" dirty="0" err="1" smtClean="0"/>
+              <a:t>MyEasyPort</a:t>
+            </a:r>
+            <a:r>
+              <a:rPr lang="en-US" dirty="0" smtClean="0"/>
+              <a:t> Design</a:t>
+            </a:r>
+            <a:endParaRPr lang="en-US" dirty="0"/>
+          </a:p>
+        </p:txBody>
+      </p:sp>
+      <p:sp>
+        <p:nvSpPr>
+          <p:cNvPr id="3" name="Content Placeholder 2"/>
+          <p:cNvSpPr>
+            <a:spLocks noGrp="1"/>
+          </p:cNvSpPr>
+          <p:nvPr>
+            <p:ph idx="1"/>
+          </p:nvPr>
+        </p:nvSpPr>
+        <p:spPr/>
+        <p:txBody>
+          <a:bodyPr>
+            <a:normAutofit lnSpcReduction="10000"/>
+          </a:bodyPr>
+          <a:lstStyle/>
+          <a:p>
+            <a:r>
+              <a:rPr lang="en-US" dirty="0" smtClean="0"/>
+              <a:t>Connecting </a:t>
+            </a:r>
+            <a:r>
+              <a:rPr lang="en-US" dirty="0" err="1" smtClean="0"/>
+              <a:t>MyEasyPort</a:t>
+            </a:r>
+            <a:r>
+              <a:rPr lang="en-US" dirty="0" smtClean="0"/>
+              <a:t> to </a:t>
+            </a:r>
+            <a:r>
+              <a:rPr lang="en-US" dirty="0" err="1" smtClean="0"/>
+              <a:t>Arcom</a:t>
+            </a:r>
+            <a:r>
+              <a:rPr lang="en-US" dirty="0" smtClean="0"/>
+              <a:t> is tricky</a:t>
+            </a:r>
+          </a:p>
+          <a:p>
+            <a:pPr lvl="1"/>
+            <a:r>
+              <a:rPr lang="en-US" dirty="0" smtClean="0"/>
+              <a:t>Logic Levels are different</a:t>
+            </a:r>
+          </a:p>
+          <a:p>
+            <a:pPr lvl="2"/>
+            <a:r>
+              <a:rPr lang="en-US" dirty="0" smtClean="0"/>
+              <a:t>3.3V </a:t>
+            </a:r>
+            <a:r>
+              <a:rPr lang="en-US" dirty="0" err="1" smtClean="0"/>
+              <a:t>MyEasyPort</a:t>
+            </a:r>
+            <a:r>
+              <a:rPr lang="en-US" dirty="0" smtClean="0"/>
+              <a:t>, 5V </a:t>
+            </a:r>
+            <a:r>
+              <a:rPr lang="en-US" dirty="0" err="1" smtClean="0"/>
+              <a:t>Arcom</a:t>
+            </a:r>
+            <a:endParaRPr lang="en-US" dirty="0" smtClean="0"/>
+          </a:p>
+          <a:p>
+            <a:pPr lvl="1"/>
+            <a:r>
+              <a:rPr lang="en-US" dirty="0" smtClean="0"/>
+              <a:t>Line Buffers</a:t>
+            </a:r>
+          </a:p>
+          <a:p>
+            <a:pPr lvl="2"/>
+            <a:r>
+              <a:rPr lang="en-US" dirty="0" err="1" smtClean="0"/>
+              <a:t>Arcom</a:t>
+            </a:r>
+            <a:r>
+              <a:rPr lang="en-US" dirty="0" smtClean="0"/>
+              <a:t> I/O card is very low current </a:t>
+            </a:r>
+          </a:p>
+          <a:p>
+            <a:pPr lvl="1"/>
+            <a:r>
+              <a:rPr lang="en-US" dirty="0" smtClean="0"/>
+              <a:t>Proper Isolation is nice to have</a:t>
+            </a:r>
+          </a:p>
+          <a:p>
+            <a:pPr lvl="2"/>
+            <a:r>
+              <a:rPr lang="en-US" dirty="0" smtClean="0"/>
+              <a:t>Ground loop, transient voltages</a:t>
+            </a:r>
+          </a:p>
+          <a:p>
+            <a:pPr lvl="1"/>
+            <a:r>
+              <a:rPr lang="en-US" dirty="0" smtClean="0"/>
+              <a:t>32 channels of I/O need to be routed</a:t>
+            </a:r>
+          </a:p>
+          <a:p>
+            <a:pPr lvl="2"/>
+            <a:r>
+              <a:rPr lang="en-US" dirty="0" smtClean="0"/>
+              <a:t>4 8-bit channels</a:t>
+            </a:r>
+          </a:p>
+          <a:p>
+            <a:pPr lvl="2"/>
+            <a:r>
+              <a:rPr lang="en-US" dirty="0" smtClean="0"/>
+              <a:t>Pin-out on </a:t>
+            </a:r>
+            <a:r>
+              <a:rPr lang="en-US" dirty="0" err="1" smtClean="0"/>
+              <a:t>Arcom</a:t>
+            </a:r>
+            <a:r>
+              <a:rPr lang="en-US" dirty="0" smtClean="0"/>
+              <a:t> is bizarre</a:t>
+            </a:r>
+          </a:p>
+        </p:txBody>
+      </p:sp>
+    </p:spTree>
+    <p:extLst>
+      <p:ext uri="{BB962C8B-B14F-4D97-AF65-F5344CB8AC3E}">
+        <p14:creationId xmlns:p14="http://schemas.microsoft.com/office/powerpoint/2010/main" val="2019726183"/>
+      </p:ext>
+    </p:extLst>
+  </p:cSld>
+  <p:clrMapOvr>
+    <a:masterClrMapping/>
+  </p:clrMapOvr>
+  <p:timing>
+    <p:tnLst>
+      <p:par>
+        <p:cTn id="1" dur="indefinite" restart="never" nodeType="tmRoot"/>
+      </p:par>
+    </p:tnLst>
+  </p:timing>
 </p:sld>
 </file>
 
@@ -3279,6 +5072,406 @@
   <p:clrMapOvr>
     <a:masterClrMapping/>
   </p:clrMapOvr>
+  <p:timing>
+    <p:tnLst>
+      <p:par>
+        <p:cTn id="1" dur="indefinite" restart="never" nodeType="tmRoot"/>
+      </p:par>
+    </p:tnLst>
+  </p:timing>
+</p:sld>
+</file>
+
+<file path=ppt/slides/slide20.xml><?xml version="1.0" encoding="utf-8"?>
+<p:sld xmlns:a="http://schemas.openxmlformats.org/drawingml/2006/main" xmlns:r="http://schemas.openxmlformats.org/officeDocument/2006/relationships" xmlns:p="http://schemas.openxmlformats.org/presentationml/2006/main">
+  <p:cSld>
+    <p:spTree>
+      <p:nvGrpSpPr>
+        <p:cNvPr id="1" name=""/>
+        <p:cNvGrpSpPr/>
+        <p:nvPr/>
+      </p:nvGrpSpPr>
+      <p:grpSpPr>
+        <a:xfrm>
+          <a:off x="0" y="0"/>
+          <a:ext cx="0" cy="0"/>
+          <a:chOff x="0" y="0"/>
+          <a:chExt cx="0" cy="0"/>
+        </a:xfrm>
+      </p:grpSpPr>
+      <p:sp>
+        <p:nvSpPr>
+          <p:cNvPr id="2" name="Title 1"/>
+          <p:cNvSpPr>
+            <a:spLocks noGrp="1"/>
+          </p:cNvSpPr>
+          <p:nvPr>
+            <p:ph type="title"/>
+          </p:nvPr>
+        </p:nvSpPr>
+        <p:spPr/>
+        <p:txBody>
+          <a:bodyPr/>
+          <a:lstStyle/>
+          <a:p>
+            <a:r>
+              <a:rPr lang="en-US" dirty="0" err="1" smtClean="0"/>
+              <a:t>MyEasyPort</a:t>
+            </a:r>
+            <a:r>
+              <a:rPr lang="en-US" dirty="0" smtClean="0"/>
+              <a:t> Design (2)</a:t>
+            </a:r>
+            <a:endParaRPr lang="en-US" dirty="0"/>
+          </a:p>
+        </p:txBody>
+      </p:sp>
+      <p:sp>
+        <p:nvSpPr>
+          <p:cNvPr id="3" name="Content Placeholder 2"/>
+          <p:cNvSpPr>
+            <a:spLocks noGrp="1"/>
+          </p:cNvSpPr>
+          <p:nvPr>
+            <p:ph idx="1"/>
+          </p:nvPr>
+        </p:nvSpPr>
+        <p:spPr>
+          <a:xfrm>
+            <a:off x="304800" y="1676400"/>
+            <a:ext cx="8534400" cy="4525963"/>
+          </a:xfrm>
+        </p:spPr>
+        <p:txBody>
+          <a:bodyPr/>
+          <a:lstStyle/>
+          <a:p>
+            <a:r>
+              <a:rPr lang="en-US" dirty="0" smtClean="0"/>
+              <a:t>Silicon Labs Si84XX CMOS isolator</a:t>
+            </a:r>
+          </a:p>
+          <a:p>
+            <a:pPr lvl="1"/>
+            <a:r>
+              <a:rPr lang="en-US" dirty="0" smtClean="0"/>
+              <a:t>Level shifting, line buffering, isolating package</a:t>
+            </a:r>
+          </a:p>
+          <a:p>
+            <a:pPr lvl="2"/>
+            <a:r>
+              <a:rPr lang="en-US" dirty="0" smtClean="0"/>
+              <a:t>Everything in one inexpensive IC</a:t>
+            </a:r>
+          </a:p>
+          <a:p>
+            <a:pPr lvl="2"/>
+            <a:r>
+              <a:rPr lang="en-US" dirty="0" smtClean="0"/>
+              <a:t>It’s only available in SMD packages</a:t>
+            </a:r>
+          </a:p>
+          <a:p>
+            <a:pPr lvl="1"/>
+            <a:r>
+              <a:rPr lang="en-US" dirty="0" smtClean="0"/>
+              <a:t>4 channels of I/O at up to 150Mbs (using ~15bps)</a:t>
+            </a:r>
+          </a:p>
+          <a:p>
+            <a:pPr lvl="1"/>
+            <a:r>
+              <a:rPr lang="en-US" dirty="0" smtClean="0"/>
+              <a:t>Chose Si8442</a:t>
+            </a:r>
+          </a:p>
+          <a:p>
+            <a:pPr lvl="2"/>
+            <a:r>
+              <a:rPr lang="en-US" dirty="0" smtClean="0"/>
+              <a:t>2 Channels each way</a:t>
+            </a:r>
+          </a:p>
+          <a:p>
+            <a:pPr lvl="2"/>
+            <a:r>
+              <a:rPr lang="en-US" dirty="0" smtClean="0"/>
+              <a:t>Low power consumption so </a:t>
+            </a:r>
+            <a:r>
+              <a:rPr lang="en-US" dirty="0" err="1" smtClean="0"/>
+              <a:t>Arcom</a:t>
+            </a:r>
+            <a:r>
+              <a:rPr lang="en-US" dirty="0" smtClean="0"/>
+              <a:t> and USB can power it</a:t>
+            </a:r>
+            <a:endParaRPr lang="en-US" dirty="0"/>
+          </a:p>
+        </p:txBody>
+      </p:sp>
+    </p:spTree>
+    <p:extLst>
+      <p:ext uri="{BB962C8B-B14F-4D97-AF65-F5344CB8AC3E}">
+        <p14:creationId xmlns:p14="http://schemas.microsoft.com/office/powerpoint/2010/main" val="654601986"/>
+      </p:ext>
+    </p:extLst>
+  </p:cSld>
+  <p:clrMapOvr>
+    <a:masterClrMapping/>
+  </p:clrMapOvr>
+  <p:timing>
+    <p:tnLst>
+      <p:par>
+        <p:cTn id="1" dur="indefinite" restart="never" nodeType="tmRoot"/>
+      </p:par>
+    </p:tnLst>
+  </p:timing>
+</p:sld>
+</file>
+
+<file path=ppt/slides/slide21.xml><?xml version="1.0" encoding="utf-8"?>
+<p:sld xmlns:a="http://schemas.openxmlformats.org/drawingml/2006/main" xmlns:r="http://schemas.openxmlformats.org/officeDocument/2006/relationships" xmlns:p="http://schemas.openxmlformats.org/presentationml/2006/main">
+  <p:cSld>
+    <p:spTree>
+      <p:nvGrpSpPr>
+        <p:cNvPr id="1" name=""/>
+        <p:cNvGrpSpPr/>
+        <p:nvPr/>
+      </p:nvGrpSpPr>
+      <p:grpSpPr>
+        <a:xfrm>
+          <a:off x="0" y="0"/>
+          <a:ext cx="0" cy="0"/>
+          <a:chOff x="0" y="0"/>
+          <a:chExt cx="0" cy="0"/>
+        </a:xfrm>
+      </p:grpSpPr>
+      <p:sp>
+        <p:nvSpPr>
+          <p:cNvPr id="2" name="Title 1"/>
+          <p:cNvSpPr>
+            <a:spLocks noGrp="1"/>
+          </p:cNvSpPr>
+          <p:nvPr>
+            <p:ph type="title"/>
+          </p:nvPr>
+        </p:nvSpPr>
+        <p:spPr/>
+        <p:txBody>
+          <a:bodyPr/>
+          <a:lstStyle/>
+          <a:p>
+            <a:r>
+              <a:rPr lang="en-US" dirty="0" err="1" smtClean="0"/>
+              <a:t>MyEasyPort</a:t>
+            </a:r>
+            <a:r>
+              <a:rPr lang="en-US" dirty="0" smtClean="0"/>
+              <a:t> Design (3)</a:t>
+            </a:r>
+            <a:endParaRPr lang="en-US" dirty="0"/>
+          </a:p>
+        </p:txBody>
+      </p:sp>
+      <p:sp>
+        <p:nvSpPr>
+          <p:cNvPr id="5" name="Content Placeholder 4"/>
+          <p:cNvSpPr>
+            <a:spLocks noGrp="1"/>
+          </p:cNvSpPr>
+          <p:nvPr>
+            <p:ph idx="1"/>
+          </p:nvPr>
+        </p:nvSpPr>
+        <p:spPr>
+          <a:xfrm>
+            <a:off x="457200" y="1600201"/>
+            <a:ext cx="8229600" cy="1143000"/>
+          </a:xfrm>
+        </p:spPr>
+        <p:txBody>
+          <a:bodyPr/>
+          <a:lstStyle/>
+          <a:p>
+            <a:r>
+              <a:rPr lang="en-US" dirty="0" smtClean="0"/>
+              <a:t>Used Excel to Experiment with Pin Outs</a:t>
+            </a:r>
+            <a:endParaRPr lang="en-US" dirty="0"/>
+          </a:p>
+        </p:txBody>
+      </p:sp>
+      <p:pic>
+        <p:nvPicPr>
+          <p:cNvPr id="7170" name="Picture 2"/>
+          <p:cNvPicPr>
+            <a:picLocks noChangeAspect="1" noChangeArrowheads="1"/>
+          </p:cNvPicPr>
+          <p:nvPr/>
+        </p:nvPicPr>
+        <p:blipFill>
+          <a:blip r:embed="rId2">
+            <a:extLst>
+              <a:ext uri="{28A0092B-C50C-407E-A947-70E740481C1C}">
+                <a14:useLocalDpi xmlns:a14="http://schemas.microsoft.com/office/drawing/2010/main" val="0"/>
+              </a:ext>
+            </a:extLst>
+          </a:blip>
+          <a:srcRect/>
+          <a:stretch>
+            <a:fillRect/>
+          </a:stretch>
+        </p:blipFill>
+        <p:spPr bwMode="auto">
+          <a:xfrm>
+            <a:off x="155489" y="2743200"/>
+            <a:ext cx="8953500" cy="3970363"/>
+          </a:xfrm>
+          <a:prstGeom prst="rect">
+            <a:avLst/>
+          </a:prstGeom>
+          <a:noFill/>
+          <a:ln>
+            <a:noFill/>
+          </a:ln>
+          <a:extLst>
+            <a:ext uri="{909E8E84-426E-40DD-AFC4-6F175D3DCCD1}">
+              <a14:hiddenFill xmlns:a14="http://schemas.microsoft.com/office/drawing/2010/main">
+                <a:solidFill>
+                  <a:schemeClr val="accent1"/>
+                </a:solidFill>
+              </a14:hiddenFill>
+            </a:ext>
+            <a:ext uri="{91240B29-F687-4F45-9708-019B960494DF}">
+              <a14:hiddenLine xmlns:a14="http://schemas.microsoft.com/office/drawing/2010/main" w="9525">
+                <a:solidFill>
+                  <a:schemeClr val="tx1"/>
+                </a:solidFill>
+                <a:miter lim="800000"/>
+                <a:headEnd/>
+                <a:tailEnd/>
+              </a14:hiddenLine>
+            </a:ext>
+          </a:extLst>
+        </p:spPr>
+      </p:pic>
+    </p:spTree>
+    <p:extLst>
+      <p:ext uri="{BB962C8B-B14F-4D97-AF65-F5344CB8AC3E}">
+        <p14:creationId xmlns:p14="http://schemas.microsoft.com/office/powerpoint/2010/main" val="1656750451"/>
+      </p:ext>
+    </p:extLst>
+  </p:cSld>
+  <p:clrMapOvr>
+    <a:masterClrMapping/>
+  </p:clrMapOvr>
+</p:sld>
+</file>
+
+<file path=ppt/slides/slide22.xml><?xml version="1.0" encoding="utf-8"?>
+<p:sld xmlns:a="http://schemas.openxmlformats.org/drawingml/2006/main" xmlns:r="http://schemas.openxmlformats.org/officeDocument/2006/relationships" xmlns:p="http://schemas.openxmlformats.org/presentationml/2006/main">
+  <p:cSld>
+    <p:spTree>
+      <p:nvGrpSpPr>
+        <p:cNvPr id="1" name=""/>
+        <p:cNvGrpSpPr/>
+        <p:nvPr/>
+      </p:nvGrpSpPr>
+      <p:grpSpPr>
+        <a:xfrm>
+          <a:off x="0" y="0"/>
+          <a:ext cx="0" cy="0"/>
+          <a:chOff x="0" y="0"/>
+          <a:chExt cx="0" cy="0"/>
+        </a:xfrm>
+      </p:grpSpPr>
+      <p:sp>
+        <p:nvSpPr>
+          <p:cNvPr id="2" name="Title 1"/>
+          <p:cNvSpPr>
+            <a:spLocks noGrp="1"/>
+          </p:cNvSpPr>
+          <p:nvPr>
+            <p:ph type="title"/>
+          </p:nvPr>
+        </p:nvSpPr>
+        <p:spPr/>
+        <p:txBody>
+          <a:bodyPr/>
+          <a:lstStyle/>
+          <a:p>
+            <a:r>
+              <a:rPr lang="en-US" dirty="0" err="1" smtClean="0"/>
+              <a:t>MyEasyPort</a:t>
+            </a:r>
+            <a:r>
+              <a:rPr lang="en-US" dirty="0" smtClean="0"/>
+              <a:t> Design (4)</a:t>
+            </a:r>
+            <a:endParaRPr lang="en-US" dirty="0"/>
+          </a:p>
+        </p:txBody>
+      </p:sp>
+      <p:pic>
+        <p:nvPicPr>
+          <p:cNvPr id="6147" name="Picture 3" descr="C:\Users\zagi\SkyDrive\GRP\docs\hw\eagle\MyEasyPort\MyEasyPort.png"/>
+          <p:cNvPicPr>
+            <a:picLocks noChangeAspect="1" noChangeArrowheads="1"/>
+          </p:cNvPicPr>
+          <p:nvPr/>
+        </p:nvPicPr>
+        <p:blipFill>
+          <a:blip r:embed="rId2" cstate="print">
+            <a:extLst>
+              <a:ext uri="{28A0092B-C50C-407E-A947-70E740481C1C}">
+                <a14:useLocalDpi xmlns:a14="http://schemas.microsoft.com/office/drawing/2010/main" val="0"/>
+              </a:ext>
+            </a:extLst>
+          </a:blip>
+          <a:srcRect/>
+          <a:stretch>
+            <a:fillRect/>
+          </a:stretch>
+        </p:blipFill>
+        <p:spPr bwMode="auto">
+          <a:xfrm>
+            <a:off x="1752600" y="1143000"/>
+            <a:ext cx="5274299" cy="5614092"/>
+          </a:xfrm>
+          <a:prstGeom prst="rect">
+            <a:avLst/>
+          </a:prstGeom>
+          <a:noFill/>
+          <a:extLst>
+            <a:ext uri="{909E8E84-426E-40DD-AFC4-6F175D3DCCD1}">
+              <a14:hiddenFill xmlns:a14="http://schemas.microsoft.com/office/drawing/2010/main">
+                <a:solidFill>
+                  <a:srgbClr val="FFFFFF"/>
+                </a:solidFill>
+              </a14:hiddenFill>
+            </a:ext>
+          </a:extLst>
+        </p:spPr>
+      </p:pic>
+    </p:spTree>
+    <p:extLst>
+      <p:ext uri="{BB962C8B-B14F-4D97-AF65-F5344CB8AC3E}">
+        <p14:creationId xmlns:p14="http://schemas.microsoft.com/office/powerpoint/2010/main" val="4145748103"/>
+      </p:ext>
+    </p:extLst>
+  </p:cSld>
+  <p:clrMapOvr>
+    <a:masterClrMapping/>
+  </p:clrMapOvr>
+  <p:timing>
+    <p:tnLst>
+      <p:par>
+        <p:cTn id="1" dur="indefinite" restart="never" nodeType="tmRoot"/>
+      </p:par>
+    </p:tnLst>
+  </p:timing>
 </p:sld>
 </file>
 
@@ -3411,6 +5604,13 @@
   <p:clrMapOvr>
     <a:masterClrMapping/>
   </p:clrMapOvr>
+  <p:timing>
+    <p:tnLst>
+      <p:par>
+        <p:cTn id="1" dur="indefinite" restart="never" nodeType="tmRoot"/>
+      </p:par>
+    </p:tnLst>
+  </p:timing>
 </p:sld>
 </file>
 
@@ -3528,6 +5728,13 @@
   <p:clrMapOvr>
     <a:masterClrMapping/>
   </p:clrMapOvr>
+  <p:timing>
+    <p:tnLst>
+      <p:par>
+        <p:cTn id="1" dur="indefinite" restart="never" nodeType="tmRoot"/>
+      </p:par>
+    </p:tnLst>
+  </p:timing>
 </p:sld>
 </file>
 
@@ -3679,7 +5886,7 @@
           <a:graphicData uri="http://schemas.openxmlformats.org/presentationml/2006/ole">
             <mc:AlternateContent xmlns:mc="http://schemas.openxmlformats.org/markup-compatibility/2006">
               <mc:Choice xmlns:v="urn:schemas-microsoft-com:vml" Requires="v">
-                <p:oleObj spid="_x0000_s1031" name="Visio" r:id="rId3" imgW="3712977" imgH="2206710" progId="Visio.Drawing.11">
+                <p:oleObj spid="_x0000_s1040" name="Visio" r:id="rId3" imgW="3712977" imgH="2206710" progId="Visio.Drawing.11">
                   <p:embed/>
                 </p:oleObj>
               </mc:Choice>
@@ -3743,6 +5950,13 @@
   <p:clrMapOvr>
     <a:masterClrMapping/>
   </p:clrMapOvr>
+  <p:timing>
+    <p:tnLst>
+      <p:par>
+        <p:cTn id="1" dur="indefinite" restart="never" nodeType="tmRoot"/>
+      </p:par>
+    </p:tnLst>
+  </p:timing>
 </p:sld>
 </file>
 
@@ -3840,6 +6054,13 @@
   <p:clrMapOvr>
     <a:masterClrMapping/>
   </p:clrMapOvr>
+  <p:timing>
+    <p:tnLst>
+      <p:par>
+        <p:cTn id="1" dur="indefinite" restart="never" nodeType="tmRoot"/>
+      </p:par>
+    </p:tnLst>
+  </p:timing>
 </p:sld>
 </file>
 
@@ -3876,7 +6097,7 @@
           <a:lstStyle/>
           <a:p>
             <a:r>
-              <a:rPr lang="en-US" smtClean="0"/>
+              <a:rPr lang="en-US" dirty="0" smtClean="0"/>
               <a:t>Analyzing EasyVeep</a:t>
             </a:r>
             <a:endParaRPr lang="en-US" dirty="0"/>
@@ -3898,7 +6119,51 @@
           <a:bodyPr/>
           <a:lstStyle/>
           <a:p>
-            <a:endParaRPr lang="en-US" dirty="0"/>
+            <a:r>
+              <a:rPr lang="en-US" dirty="0" smtClean="0"/>
+              <a:t>Hex-Rays Interactive Disassembler (freeware)</a:t>
+            </a:r>
+          </a:p>
+          <a:p>
+            <a:r>
+              <a:rPr lang="en-US" dirty="0" smtClean="0"/>
+              <a:t>Analyzed various components of the EasyVeep software distribution to find Serial Protocol</a:t>
+            </a:r>
+          </a:p>
+          <a:p>
+            <a:pPr lvl="1"/>
+            <a:r>
+              <a:rPr lang="en-US" dirty="0" smtClean="0"/>
+              <a:t>EasyVeep.exe</a:t>
+            </a:r>
+          </a:p>
+          <a:p>
+            <a:pPr lvl="2"/>
+            <a:r>
+              <a:rPr lang="en-US" dirty="0" smtClean="0"/>
+              <a:t>Main executable, no serial communications code</a:t>
+            </a:r>
+          </a:p>
+          <a:p>
+            <a:pPr lvl="1"/>
+            <a:r>
+              <a:rPr lang="en-US" dirty="0" smtClean="0"/>
+              <a:t>EasyPort.ocx</a:t>
+            </a:r>
+          </a:p>
+          <a:p>
+            <a:pPr lvl="2"/>
+            <a:r>
+              <a:rPr lang="en-US" dirty="0" smtClean="0"/>
+              <a:t>ActiveX Control responsible for all communication to EasyPort.</a:t>
+            </a:r>
+          </a:p>
+          <a:p>
+            <a:pPr lvl="2"/>
+            <a:r>
+              <a:rPr lang="en-US" dirty="0" smtClean="0"/>
+              <a:t>Has format of a Windows COM Object</a:t>
+            </a:r>
           </a:p>
         </p:txBody>
       </p:sp>
@@ -3912,6 +6177,869 @@
   <p:clrMapOvr>
     <a:masterClrMapping/>
   </p:clrMapOvr>
+  <p:timing>
+    <p:tnLst>
+      <p:par>
+        <p:cTn id="1" dur="indefinite" restart="never" nodeType="tmRoot"/>
+      </p:par>
+    </p:tnLst>
+  </p:timing>
+</p:sld>
+</file>
+
+<file path=ppt/slides/slide8.xml><?xml version="1.0" encoding="utf-8"?>
+<p:sld xmlns:a="http://schemas.openxmlformats.org/drawingml/2006/main" xmlns:r="http://schemas.openxmlformats.org/officeDocument/2006/relationships" xmlns:p="http://schemas.openxmlformats.org/presentationml/2006/main">
+  <p:cSld>
+    <p:spTree>
+      <p:nvGrpSpPr>
+        <p:cNvPr id="1" name=""/>
+        <p:cNvGrpSpPr/>
+        <p:nvPr/>
+      </p:nvGrpSpPr>
+      <p:grpSpPr>
+        <a:xfrm>
+          <a:off x="0" y="0"/>
+          <a:ext cx="0" cy="0"/>
+          <a:chOff x="0" y="0"/>
+          <a:chExt cx="0" cy="0"/>
+        </a:xfrm>
+      </p:grpSpPr>
+      <p:sp>
+        <p:nvSpPr>
+          <p:cNvPr id="2" name="Title 1"/>
+          <p:cNvSpPr>
+            <a:spLocks noGrp="1"/>
+          </p:cNvSpPr>
+          <p:nvPr>
+            <p:ph type="title"/>
+          </p:nvPr>
+        </p:nvSpPr>
+        <p:spPr/>
+        <p:txBody>
+          <a:bodyPr/>
+          <a:lstStyle/>
+          <a:p>
+            <a:r>
+              <a:rPr lang="en-US" dirty="0" smtClean="0"/>
+              <a:t>Analyzing EasyPort.ocx</a:t>
+            </a:r>
+            <a:endParaRPr lang="en-US" dirty="0"/>
+          </a:p>
+        </p:txBody>
+      </p:sp>
+      <p:sp>
+        <p:nvSpPr>
+          <p:cNvPr id="3" name="Content Placeholder 2"/>
+          <p:cNvSpPr>
+            <a:spLocks noGrp="1"/>
+          </p:cNvSpPr>
+          <p:nvPr>
+            <p:ph idx="1"/>
+          </p:nvPr>
+        </p:nvSpPr>
+        <p:spPr/>
+        <p:txBody>
+          <a:bodyPr/>
+          <a:lstStyle/>
+          <a:p>
+            <a:r>
+              <a:rPr lang="en-US" dirty="0" smtClean="0"/>
+              <a:t>Looked through the Virtual Method Table</a:t>
+            </a:r>
+          </a:p>
+          <a:p>
+            <a:pPr lvl="1"/>
+            <a:r>
+              <a:rPr lang="en-US" dirty="0" smtClean="0"/>
+              <a:t>The </a:t>
+            </a:r>
+            <a:r>
+              <a:rPr lang="en-US" dirty="0" err="1" smtClean="0"/>
+              <a:t>vtable</a:t>
+            </a:r>
+            <a:r>
+              <a:rPr lang="en-US" dirty="0" smtClean="0"/>
+              <a:t> holds human readable names and pointers to the associated messages</a:t>
+            </a:r>
+          </a:p>
+          <a:p>
+            <a:r>
+              <a:rPr lang="en-US" dirty="0" smtClean="0"/>
+              <a:t>Found many usefully named functions</a:t>
+            </a:r>
+          </a:p>
+          <a:p>
+            <a:pPr lvl="1"/>
+            <a:r>
+              <a:rPr lang="en-US" dirty="0" smtClean="0"/>
+              <a:t>Connect, </a:t>
+            </a:r>
+            <a:r>
+              <a:rPr lang="en-US" dirty="0" err="1" smtClean="0"/>
+              <a:t>SetOutput</a:t>
+            </a:r>
+            <a:r>
+              <a:rPr lang="en-US" dirty="0" smtClean="0"/>
+              <a:t>, </a:t>
+            </a:r>
+            <a:r>
+              <a:rPr lang="en-US" dirty="0" err="1" smtClean="0"/>
+              <a:t>GetInputWord</a:t>
+            </a:r>
+            <a:endParaRPr lang="en-US" dirty="0"/>
+          </a:p>
+          <a:p>
+            <a:r>
+              <a:rPr lang="en-US" dirty="0" smtClean="0"/>
+              <a:t>Traced execution of each method of interest and found the format strings being used to build and decode commands</a:t>
+            </a:r>
+          </a:p>
+          <a:p>
+            <a:pPr lvl="1"/>
+            <a:endParaRPr lang="en-US" dirty="0"/>
+          </a:p>
+        </p:txBody>
+      </p:sp>
+    </p:spTree>
+    <p:extLst>
+      <p:ext uri="{BB962C8B-B14F-4D97-AF65-F5344CB8AC3E}">
+        <p14:creationId xmlns:p14="http://schemas.microsoft.com/office/powerpoint/2010/main" val="3501844162"/>
+      </p:ext>
+    </p:extLst>
+  </p:cSld>
+  <p:clrMapOvr>
+    <a:masterClrMapping/>
+  </p:clrMapOvr>
+  <p:timing>
+    <p:tnLst>
+      <p:par>
+        <p:cTn id="1" dur="indefinite" restart="never" nodeType="tmRoot"/>
+      </p:par>
+    </p:tnLst>
+  </p:timing>
+</p:sld>
+</file>
+
+<file path=ppt/slides/slide9.xml><?xml version="1.0" encoding="utf-8"?>
+<p:sld xmlns:a="http://schemas.openxmlformats.org/drawingml/2006/main" xmlns:r="http://schemas.openxmlformats.org/officeDocument/2006/relationships" xmlns:p="http://schemas.openxmlformats.org/presentationml/2006/main">
+  <p:cSld>
+    <p:spTree>
+      <p:nvGrpSpPr>
+        <p:cNvPr id="1" name=""/>
+        <p:cNvGrpSpPr/>
+        <p:nvPr/>
+      </p:nvGrpSpPr>
+      <p:grpSpPr>
+        <a:xfrm>
+          <a:off x="0" y="0"/>
+          <a:ext cx="0" cy="0"/>
+          <a:chOff x="0" y="0"/>
+          <a:chExt cx="0" cy="0"/>
+        </a:xfrm>
+      </p:grpSpPr>
+      <p:sp>
+        <p:nvSpPr>
+          <p:cNvPr id="2" name="Title 1"/>
+          <p:cNvSpPr>
+            <a:spLocks noGrp="1"/>
+          </p:cNvSpPr>
+          <p:nvPr>
+            <p:ph type="title"/>
+          </p:nvPr>
+        </p:nvSpPr>
+        <p:spPr/>
+        <p:txBody>
+          <a:bodyPr/>
+          <a:lstStyle/>
+          <a:p>
+            <a:r>
+              <a:rPr lang="en-US" dirty="0" smtClean="0"/>
+              <a:t>EasyPort Protocol</a:t>
+            </a:r>
+            <a:endParaRPr lang="en-US" dirty="0"/>
+          </a:p>
+        </p:txBody>
+      </p:sp>
+      <p:graphicFrame>
+        <p:nvGraphicFramePr>
+          <p:cNvPr id="4" name="Content Placeholder 3"/>
+          <p:cNvGraphicFramePr>
+            <a:graphicFrameLocks noGrp="1"/>
+          </p:cNvGraphicFramePr>
+          <p:nvPr>
+            <p:ph idx="1"/>
+            <p:extLst>
+              <p:ext uri="{D42A27DB-BD31-4B8C-83A1-F6EECF244321}">
+                <p14:modId xmlns:p14="http://schemas.microsoft.com/office/powerpoint/2010/main" val="2557259292"/>
+              </p:ext>
+            </p:extLst>
+          </p:nvPr>
+        </p:nvGraphicFramePr>
+        <p:xfrm>
+          <a:off x="533400" y="1219197"/>
+          <a:ext cx="7848600" cy="4343404"/>
+        </p:xfrm>
+        <a:graphic>
+          <a:graphicData uri="http://schemas.openxmlformats.org/drawingml/2006/table">
+            <a:tbl>
+              <a:tblPr firstRow="1" firstCol="1" bandRow="1">
+                <a:tableStyleId>{5C22544A-7EE6-4342-B048-85BDC9FD1C3A}</a:tableStyleId>
+              </a:tblPr>
+              <a:tblGrid>
+                <a:gridCol w="3926905"/>
+                <a:gridCol w="3921695"/>
+              </a:tblGrid>
+              <a:tr h="190419">
+                <a:tc>
+                  <a:txBody>
+                    <a:bodyPr/>
+                    <a:lstStyle/>
+                    <a:p>
+                      <a:pPr marL="0" marR="0">
+                        <a:lnSpc>
+                          <a:spcPct val="115000"/>
+                        </a:lnSpc>
+                        <a:spcBef>
+                          <a:spcPts val="0"/>
+                        </a:spcBef>
+                        <a:spcAft>
+                          <a:spcPts val="0"/>
+                        </a:spcAft>
+                      </a:pPr>
+                      <a:r>
+                        <a:rPr lang="en-US" sz="1100" dirty="0">
+                          <a:effectLst/>
+                        </a:rPr>
+                        <a:t>Command Format</a:t>
+                      </a:r>
+                      <a:endParaRPr lang="en-US" sz="1100" dirty="0">
+                        <a:effectLst/>
+                        <a:latin typeface="Calibri"/>
+                        <a:ea typeface="SimSun"/>
+                        <a:cs typeface="Times New Roman"/>
+                      </a:endParaRPr>
+                    </a:p>
+                  </a:txBody>
+                  <a:tcPr marL="68580" marR="68580" marT="0" marB="0"/>
+                </a:tc>
+                <a:tc>
+                  <a:txBody>
+                    <a:bodyPr/>
+                    <a:lstStyle/>
+                    <a:p>
+                      <a:pPr marL="0" marR="0">
+                        <a:lnSpc>
+                          <a:spcPct val="115000"/>
+                        </a:lnSpc>
+                        <a:spcBef>
+                          <a:spcPts val="0"/>
+                        </a:spcBef>
+                        <a:spcAft>
+                          <a:spcPts val="0"/>
+                        </a:spcAft>
+                      </a:pPr>
+                      <a:r>
+                        <a:rPr lang="en-US" sz="1100">
+                          <a:effectLst/>
+                        </a:rPr>
+                        <a:t>Description</a:t>
+                      </a:r>
+                      <a:endParaRPr lang="en-US" sz="1100">
+                        <a:effectLst/>
+                        <a:latin typeface="Calibri"/>
+                        <a:ea typeface="SimSun"/>
+                        <a:cs typeface="Times New Roman"/>
+                      </a:endParaRPr>
+                    </a:p>
+                  </a:txBody>
+                  <a:tcPr marL="68580" marR="68580" marT="0" marB="0"/>
+                </a:tc>
+              </a:tr>
+              <a:tr h="392699">
+                <a:tc>
+                  <a:txBody>
+                    <a:bodyPr/>
+                    <a:lstStyle/>
+                    <a:p>
+                      <a:pPr marL="0" marR="0">
+                        <a:lnSpc>
+                          <a:spcPct val="115000"/>
+                        </a:lnSpc>
+                        <a:spcBef>
+                          <a:spcPts val="0"/>
+                        </a:spcBef>
+                        <a:spcAft>
+                          <a:spcPts val="0"/>
+                        </a:spcAft>
+                      </a:pPr>
+                      <a:r>
+                        <a:rPr lang="en-US" sz="1100">
+                          <a:effectLst/>
+                        </a:rPr>
+                        <a:t>setup0</a:t>
+                      </a:r>
+                      <a:endParaRPr lang="en-US" sz="1100">
+                        <a:effectLst/>
+                        <a:latin typeface="Calibri"/>
+                        <a:ea typeface="SimSun"/>
+                        <a:cs typeface="Times New Roman"/>
+                      </a:endParaRPr>
+                    </a:p>
+                  </a:txBody>
+                  <a:tcPr marL="68580" marR="68580" marT="0" marB="0"/>
+                </a:tc>
+                <a:tc>
+                  <a:txBody>
+                    <a:bodyPr/>
+                    <a:lstStyle/>
+                    <a:p>
+                      <a:pPr marL="0" marR="0">
+                        <a:lnSpc>
+                          <a:spcPct val="115000"/>
+                        </a:lnSpc>
+                        <a:spcBef>
+                          <a:spcPts val="0"/>
+                        </a:spcBef>
+                        <a:spcAft>
+                          <a:spcPts val="0"/>
+                        </a:spcAft>
+                      </a:pPr>
+                      <a:r>
+                        <a:rPr lang="en-US" sz="1100">
+                          <a:effectLst/>
+                        </a:rPr>
+                        <a:t>Request made by PC to initialize connected EasyPorts.</a:t>
+                      </a:r>
+                      <a:endParaRPr lang="en-US" sz="1100">
+                        <a:effectLst/>
+                        <a:latin typeface="Calibri"/>
+                        <a:ea typeface="SimSun"/>
+                        <a:cs typeface="Times New Roman"/>
+                      </a:endParaRPr>
+                    </a:p>
+                  </a:txBody>
+                  <a:tcPr marL="68580" marR="68580" marT="0" marB="0"/>
+                </a:tc>
+              </a:tr>
+              <a:tr h="392699">
+                <a:tc>
+                  <a:txBody>
+                    <a:bodyPr/>
+                    <a:lstStyle/>
+                    <a:p>
+                      <a:pPr marL="0" marR="0">
+                        <a:lnSpc>
+                          <a:spcPct val="115000"/>
+                        </a:lnSpc>
+                        <a:spcBef>
+                          <a:spcPts val="0"/>
+                        </a:spcBef>
+                        <a:spcAft>
+                          <a:spcPts val="0"/>
+                        </a:spcAft>
+                      </a:pPr>
+                      <a:r>
+                        <a:rPr lang="en-US" sz="1100">
+                          <a:effectLst/>
+                        </a:rPr>
+                        <a:t>setup[1-4]</a:t>
+                      </a:r>
+                      <a:endParaRPr lang="en-US" sz="1100">
+                        <a:effectLst/>
+                        <a:latin typeface="Calibri"/>
+                        <a:ea typeface="SimSun"/>
+                        <a:cs typeface="Times New Roman"/>
+                      </a:endParaRPr>
+                    </a:p>
+                  </a:txBody>
+                  <a:tcPr marL="68580" marR="68580" marT="0" marB="0"/>
+                </a:tc>
+                <a:tc>
+                  <a:txBody>
+                    <a:bodyPr/>
+                    <a:lstStyle/>
+                    <a:p>
+                      <a:pPr marL="0" marR="0">
+                        <a:lnSpc>
+                          <a:spcPct val="115000"/>
+                        </a:lnSpc>
+                        <a:spcBef>
+                          <a:spcPts val="0"/>
+                        </a:spcBef>
+                        <a:spcAft>
+                          <a:spcPts val="0"/>
+                        </a:spcAft>
+                      </a:pPr>
+                      <a:r>
+                        <a:rPr lang="en-US" sz="1100">
+                          <a:effectLst/>
+                        </a:rPr>
+                        <a:t>EasyPort response to setup0 command requesting a module number 1-4.</a:t>
+                      </a:r>
+                      <a:endParaRPr lang="en-US" sz="1100">
+                        <a:effectLst/>
+                        <a:latin typeface="Calibri"/>
+                        <a:ea typeface="SimSun"/>
+                        <a:cs typeface="Times New Roman"/>
+                      </a:endParaRPr>
+                    </a:p>
+                  </a:txBody>
+                  <a:tcPr marL="68580" marR="68580" marT="0" marB="0"/>
+                </a:tc>
+              </a:tr>
+              <a:tr h="190419">
+                <a:tc>
+                  <a:txBody>
+                    <a:bodyPr/>
+                    <a:lstStyle/>
+                    <a:p>
+                      <a:pPr marL="0" marR="0">
+                        <a:lnSpc>
+                          <a:spcPct val="115000"/>
+                        </a:lnSpc>
+                        <a:spcBef>
+                          <a:spcPts val="0"/>
+                        </a:spcBef>
+                        <a:spcAft>
+                          <a:spcPts val="0"/>
+                        </a:spcAft>
+                      </a:pPr>
+                      <a:r>
+                        <a:rPr lang="en-US" sz="1100">
+                          <a:effectLst/>
+                        </a:rPr>
+                        <a:t>DV</a:t>
+                      </a:r>
+                      <a:endParaRPr lang="en-US" sz="1100">
+                        <a:effectLst/>
+                        <a:latin typeface="Calibri"/>
+                        <a:ea typeface="SimSun"/>
+                        <a:cs typeface="Times New Roman"/>
+                      </a:endParaRPr>
+                    </a:p>
+                  </a:txBody>
+                  <a:tcPr marL="68580" marR="68580" marT="0" marB="0"/>
+                </a:tc>
+                <a:tc>
+                  <a:txBody>
+                    <a:bodyPr/>
+                    <a:lstStyle/>
+                    <a:p>
+                      <a:pPr marL="0" marR="0">
+                        <a:lnSpc>
+                          <a:spcPct val="115000"/>
+                        </a:lnSpc>
+                        <a:spcBef>
+                          <a:spcPts val="0"/>
+                        </a:spcBef>
+                        <a:spcAft>
+                          <a:spcPts val="0"/>
+                        </a:spcAft>
+                      </a:pPr>
+                      <a:r>
+                        <a:rPr lang="en-US" sz="1100">
+                          <a:effectLst/>
+                        </a:rPr>
+                        <a:t>Request by PC to get EasyPort version</a:t>
+                      </a:r>
+                      <a:endParaRPr lang="en-US" sz="1100">
+                        <a:effectLst/>
+                        <a:latin typeface="Calibri"/>
+                        <a:ea typeface="SimSun"/>
+                        <a:cs typeface="Times New Roman"/>
+                      </a:endParaRPr>
+                    </a:p>
+                  </a:txBody>
+                  <a:tcPr marL="68580" marR="68580" marT="0" marB="0"/>
+                </a:tc>
+              </a:tr>
+              <a:tr h="594978">
+                <a:tc>
+                  <a:txBody>
+                    <a:bodyPr/>
+                    <a:lstStyle/>
+                    <a:p>
+                      <a:pPr marL="0" marR="0">
+                        <a:lnSpc>
+                          <a:spcPct val="115000"/>
+                        </a:lnSpc>
+                        <a:spcBef>
+                          <a:spcPts val="0"/>
+                        </a:spcBef>
+                        <a:spcAft>
+                          <a:spcPts val="0"/>
+                        </a:spcAft>
+                      </a:pPr>
+                      <a:r>
+                        <a:rPr lang="en-US" sz="1100">
+                          <a:effectLst/>
+                        </a:rPr>
+                        <a:t>V=\d.\d{2}</a:t>
+                      </a:r>
+                      <a:endParaRPr lang="en-US" sz="1100">
+                        <a:effectLst/>
+                        <a:latin typeface="Calibri"/>
+                        <a:ea typeface="SimSun"/>
+                        <a:cs typeface="Times New Roman"/>
+                      </a:endParaRPr>
+                    </a:p>
+                  </a:txBody>
+                  <a:tcPr marL="68580" marR="68580" marT="0" marB="0"/>
+                </a:tc>
+                <a:tc>
+                  <a:txBody>
+                    <a:bodyPr/>
+                    <a:lstStyle/>
+                    <a:p>
+                      <a:pPr marL="0" marR="0">
+                        <a:lnSpc>
+                          <a:spcPct val="115000"/>
+                        </a:lnSpc>
+                        <a:spcBef>
+                          <a:spcPts val="0"/>
+                        </a:spcBef>
+                        <a:spcAft>
+                          <a:spcPts val="0"/>
+                        </a:spcAft>
+                      </a:pPr>
+                      <a:r>
+                        <a:rPr lang="en-US" sz="1100">
+                          <a:effectLst/>
+                        </a:rPr>
+                        <a:t>Response to version request containing the version number of the EasyPort. Must exceed (1.20).</a:t>
+                      </a:r>
+                      <a:endParaRPr lang="en-US" sz="1100">
+                        <a:effectLst/>
+                        <a:latin typeface="Calibri"/>
+                        <a:ea typeface="SimSun"/>
+                        <a:cs typeface="Times New Roman"/>
+                      </a:endParaRPr>
+                    </a:p>
+                  </a:txBody>
+                  <a:tcPr marL="68580" marR="68580" marT="0" marB="0"/>
+                </a:tc>
+              </a:tr>
+              <a:tr h="594978">
+                <a:tc>
+                  <a:txBody>
+                    <a:bodyPr/>
+                    <a:lstStyle/>
+                    <a:p>
+                      <a:pPr marL="0" marR="0">
+                        <a:lnSpc>
+                          <a:spcPct val="115000"/>
+                        </a:lnSpc>
+                        <a:spcBef>
+                          <a:spcPts val="0"/>
+                        </a:spcBef>
+                        <a:spcAft>
+                          <a:spcPts val="0"/>
+                        </a:spcAft>
+                      </a:pPr>
+                      <a:r>
+                        <a:rPr lang="en-US" sz="1100">
+                          <a:effectLst/>
+                        </a:rPr>
+                        <a:t>MAW=[1-4].[0248]=[0-F]{4}</a:t>
+                      </a:r>
+                      <a:endParaRPr lang="en-US" sz="1100">
+                        <a:effectLst/>
+                        <a:latin typeface="Calibri"/>
+                        <a:ea typeface="SimSun"/>
+                        <a:cs typeface="Times New Roman"/>
+                      </a:endParaRPr>
+                    </a:p>
+                  </a:txBody>
+                  <a:tcPr marL="68580" marR="68580" marT="0" marB="0"/>
+                </a:tc>
+                <a:tc>
+                  <a:txBody>
+                    <a:bodyPr/>
+                    <a:lstStyle/>
+                    <a:p>
+                      <a:pPr marL="0" marR="0">
+                        <a:lnSpc>
+                          <a:spcPct val="115000"/>
+                        </a:lnSpc>
+                        <a:spcBef>
+                          <a:spcPts val="0"/>
+                        </a:spcBef>
+                        <a:spcAft>
+                          <a:spcPts val="0"/>
+                        </a:spcAft>
+                      </a:pPr>
+                      <a:r>
+                        <a:rPr lang="en-US" sz="1100">
+                          <a:effectLst/>
+                        </a:rPr>
+                        <a:t>Modify the 16 bit output value of EasyPort module [1-4], channel log</a:t>
+                      </a:r>
+                      <a:r>
+                        <a:rPr lang="en-US" sz="1100" baseline="-25000">
+                          <a:effectLst/>
+                        </a:rPr>
+                        <a:t>2</a:t>
+                      </a:r>
+                      <a:r>
+                        <a:rPr lang="en-US" sz="1100">
+                          <a:effectLst/>
+                        </a:rPr>
+                        <a:t>([0248]) to be the value represented by hex number [0-F]{4}.</a:t>
+                      </a:r>
+                      <a:endParaRPr lang="en-US" sz="1100">
+                        <a:effectLst/>
+                        <a:latin typeface="Calibri"/>
+                        <a:ea typeface="SimSun"/>
+                        <a:cs typeface="Times New Roman"/>
+                      </a:endParaRPr>
+                    </a:p>
+                  </a:txBody>
+                  <a:tcPr marL="68580" marR="68580" marT="0" marB="0"/>
+                </a:tc>
+              </a:tr>
+              <a:tr h="392699">
+                <a:tc>
+                  <a:txBody>
+                    <a:bodyPr/>
+                    <a:lstStyle/>
+                    <a:p>
+                      <a:pPr marL="0" marR="0">
+                        <a:lnSpc>
+                          <a:spcPct val="115000"/>
+                        </a:lnSpc>
+                        <a:spcBef>
+                          <a:spcPts val="0"/>
+                        </a:spcBef>
+                        <a:spcAft>
+                          <a:spcPts val="0"/>
+                        </a:spcAft>
+                      </a:pPr>
+                      <a:r>
+                        <a:rPr lang="en-US" sz="1100">
+                          <a:effectLst/>
+                        </a:rPr>
+                        <a:t>DEW[1-4].[0248]</a:t>
+                      </a:r>
+                      <a:endParaRPr lang="en-US" sz="1100">
+                        <a:effectLst/>
+                        <a:latin typeface="Calibri"/>
+                        <a:ea typeface="SimSun"/>
+                        <a:cs typeface="Times New Roman"/>
+                      </a:endParaRPr>
+                    </a:p>
+                  </a:txBody>
+                  <a:tcPr marL="68580" marR="68580" marT="0" marB="0"/>
+                </a:tc>
+                <a:tc>
+                  <a:txBody>
+                    <a:bodyPr/>
+                    <a:lstStyle/>
+                    <a:p>
+                      <a:pPr marL="0" marR="0">
+                        <a:lnSpc>
+                          <a:spcPct val="115000"/>
+                        </a:lnSpc>
+                        <a:spcBef>
+                          <a:spcPts val="0"/>
+                        </a:spcBef>
+                        <a:spcAft>
+                          <a:spcPts val="0"/>
+                        </a:spcAft>
+                      </a:pPr>
+                      <a:r>
+                        <a:rPr lang="en-US" sz="1100">
+                          <a:effectLst/>
+                        </a:rPr>
+                        <a:t>Request the current input values from module [1-4], channel log</a:t>
+                      </a:r>
+                      <a:r>
+                        <a:rPr lang="en-US" sz="1100" baseline="-25000">
+                          <a:effectLst/>
+                        </a:rPr>
+                        <a:t>2</a:t>
+                      </a:r>
+                      <a:r>
+                        <a:rPr lang="en-US" sz="1100">
+                          <a:effectLst/>
+                        </a:rPr>
+                        <a:t>([0248]) </a:t>
+                      </a:r>
+                      <a:endParaRPr lang="en-US" sz="1100">
+                        <a:effectLst/>
+                        <a:latin typeface="Calibri"/>
+                        <a:ea typeface="SimSun"/>
+                        <a:cs typeface="Times New Roman"/>
+                      </a:endParaRPr>
+                    </a:p>
+                  </a:txBody>
+                  <a:tcPr marL="68580" marR="68580" marT="0" marB="0"/>
+                </a:tc>
+              </a:tr>
+              <a:tr h="999535">
+                <a:tc>
+                  <a:txBody>
+                    <a:bodyPr/>
+                    <a:lstStyle/>
+                    <a:p>
+                      <a:pPr marL="0" marR="0">
+                        <a:lnSpc>
+                          <a:spcPct val="115000"/>
+                        </a:lnSpc>
+                        <a:spcBef>
+                          <a:spcPts val="0"/>
+                        </a:spcBef>
+                        <a:spcAft>
+                          <a:spcPts val="0"/>
+                        </a:spcAft>
+                      </a:pPr>
+                      <a:r>
+                        <a:rPr lang="en-US" sz="1100">
+                          <a:effectLst/>
+                        </a:rPr>
+                        <a:t>EW[1-4].[0248]=[0-F]{4}</a:t>
+                      </a:r>
+                      <a:endParaRPr lang="en-US" sz="1100">
+                        <a:effectLst/>
+                        <a:latin typeface="Calibri"/>
+                        <a:ea typeface="SimSun"/>
+                        <a:cs typeface="Times New Roman"/>
+                      </a:endParaRPr>
+                    </a:p>
+                  </a:txBody>
+                  <a:tcPr marL="68580" marR="68580" marT="0" marB="0"/>
+                </a:tc>
+                <a:tc>
+                  <a:txBody>
+                    <a:bodyPr/>
+                    <a:lstStyle/>
+                    <a:p>
+                      <a:pPr marL="0" marR="0">
+                        <a:lnSpc>
+                          <a:spcPct val="115000"/>
+                        </a:lnSpc>
+                        <a:spcBef>
+                          <a:spcPts val="0"/>
+                        </a:spcBef>
+                        <a:spcAft>
+                          <a:spcPts val="0"/>
+                        </a:spcAft>
+                      </a:pPr>
+                      <a:r>
+                        <a:rPr lang="en-US" sz="1100">
+                          <a:effectLst/>
+                        </a:rPr>
+                        <a:t>Response to input value request. The current value of the inputs is represented by a four digit hex number. DAW command is sent in response requesting the current out values the EasyPort has. A response to DAW is not required.</a:t>
+                      </a:r>
+                      <a:endParaRPr lang="en-US" sz="1100">
+                        <a:effectLst/>
+                        <a:latin typeface="Calibri"/>
+                        <a:ea typeface="SimSun"/>
+                        <a:cs typeface="Times New Roman"/>
+                      </a:endParaRPr>
+                    </a:p>
+                  </a:txBody>
+                  <a:tcPr marL="68580" marR="68580" marT="0" marB="0"/>
+                </a:tc>
+              </a:tr>
+              <a:tr h="594978">
+                <a:tc>
+                  <a:txBody>
+                    <a:bodyPr/>
+                    <a:lstStyle/>
+                    <a:p>
+                      <a:pPr marL="0" marR="0">
+                        <a:lnSpc>
+                          <a:spcPct val="115000"/>
+                        </a:lnSpc>
+                        <a:spcBef>
+                          <a:spcPts val="0"/>
+                        </a:spcBef>
+                        <a:spcAft>
+                          <a:spcPts val="0"/>
+                        </a:spcAft>
+                      </a:pPr>
+                      <a:r>
+                        <a:rPr lang="en-US" sz="1100" dirty="0">
+                          <a:effectLst/>
+                        </a:rPr>
+                        <a:t>DAW[1-4].[0248]</a:t>
+                      </a:r>
+                      <a:endParaRPr lang="en-US" sz="1100" dirty="0">
+                        <a:effectLst/>
+                        <a:latin typeface="Calibri"/>
+                        <a:ea typeface="SimSun"/>
+                        <a:cs typeface="Times New Roman"/>
+                      </a:endParaRPr>
+                    </a:p>
+                  </a:txBody>
+                  <a:tcPr marL="68580" marR="68580" marT="0" marB="0"/>
+                </a:tc>
+                <a:tc>
+                  <a:txBody>
+                    <a:bodyPr/>
+                    <a:lstStyle/>
+                    <a:p>
+                      <a:pPr marL="0" marR="0">
+                        <a:lnSpc>
+                          <a:spcPct val="115000"/>
+                        </a:lnSpc>
+                        <a:spcBef>
+                          <a:spcPts val="0"/>
+                        </a:spcBef>
+                        <a:spcAft>
+                          <a:spcPts val="0"/>
+                        </a:spcAft>
+                      </a:pPr>
+                      <a:r>
+                        <a:rPr lang="en-US" sz="1100" dirty="0">
+                          <a:effectLst/>
+                        </a:rPr>
+                        <a:t>Request the current output values from module [1-4], channel log</a:t>
+                      </a:r>
+                      <a:r>
+                        <a:rPr lang="en-US" sz="1100" baseline="-25000" dirty="0">
+                          <a:effectLst/>
+                        </a:rPr>
+                        <a:t>2</a:t>
+                      </a:r>
+                      <a:r>
+                        <a:rPr lang="en-US" sz="1100" dirty="0">
+                          <a:effectLst/>
+                        </a:rPr>
+                        <a:t>([0248]) . A response is not required in this application.</a:t>
+                      </a:r>
+                      <a:endParaRPr lang="en-US" sz="1100" dirty="0">
+                        <a:effectLst/>
+                        <a:latin typeface="Calibri"/>
+                        <a:ea typeface="SimSun"/>
+                        <a:cs typeface="Times New Roman"/>
+                      </a:endParaRPr>
+                    </a:p>
+                  </a:txBody>
+                  <a:tcPr marL="68580" marR="68580" marT="0" marB="0"/>
+                </a:tc>
+              </a:tr>
+            </a:tbl>
+          </a:graphicData>
+        </a:graphic>
+      </p:graphicFrame>
+    </p:spTree>
+    <p:extLst>
+      <p:ext uri="{BB962C8B-B14F-4D97-AF65-F5344CB8AC3E}">
+        <p14:creationId xmlns:p14="http://schemas.microsoft.com/office/powerpoint/2010/main" val="3653330332"/>
+      </p:ext>
+    </p:extLst>
+  </p:cSld>
+  <p:clrMapOvr>
+    <a:masterClrMapping/>
+  </p:clrMapOvr>
+  <p:timing>
+    <p:tnLst>
+      <p:par>
+        <p:cTn id="1" dur="indefinite" restart="never" nodeType="tmRoot"/>
+      </p:par>
+    </p:tnLst>
+  </p:timing>
 </p:sld>
 </file>
 

</xml_diff>